<commit_message>
Fixed dates, added URL escaping note
</commit_message>
<xml_diff>
--- a/presentations/2018-10 Day of the Dev/Hands-on.pptx
+++ b/presentations/2018-10 Day of the Dev/Hands-on.pptx
@@ -5,10 +5,10 @@
     <p:sldMasterId id="2147483673" r:id="rId1"/>
   </p:sldMasterIdLst>
   <p:notesMasterIdLst>
-    <p:notesMasterId r:id="rId34"/>
+    <p:notesMasterId r:id="rId35"/>
   </p:notesMasterIdLst>
   <p:handoutMasterIdLst>
-    <p:handoutMasterId r:id="rId35"/>
+    <p:handoutMasterId r:id="rId36"/>
   </p:handoutMasterIdLst>
   <p:sldIdLst>
     <p:sldId id="451" r:id="rId2"/>
@@ -20,29 +20,30 @@
     <p:sldId id="566" r:id="rId8"/>
     <p:sldId id="656" r:id="rId9"/>
     <p:sldId id="660" r:id="rId10"/>
-    <p:sldId id="658" r:id="rId11"/>
-    <p:sldId id="653" r:id="rId12"/>
-    <p:sldId id="441" r:id="rId13"/>
-    <p:sldId id="337" r:id="rId14"/>
-    <p:sldId id="419" r:id="rId15"/>
-    <p:sldId id="444" r:id="rId16"/>
-    <p:sldId id="338" r:id="rId17"/>
-    <p:sldId id="447" r:id="rId18"/>
-    <p:sldId id="382" r:id="rId19"/>
-    <p:sldId id="418" r:id="rId20"/>
-    <p:sldId id="385" r:id="rId21"/>
-    <p:sldId id="359" r:id="rId22"/>
-    <p:sldId id="386" r:id="rId23"/>
-    <p:sldId id="383" r:id="rId24"/>
-    <p:sldId id="388" r:id="rId25"/>
-    <p:sldId id="420" r:id="rId26"/>
-    <p:sldId id="421" r:id="rId27"/>
-    <p:sldId id="448" r:id="rId28"/>
-    <p:sldId id="427" r:id="rId29"/>
-    <p:sldId id="371" r:id="rId30"/>
-    <p:sldId id="417" r:id="rId31"/>
-    <p:sldId id="370" r:id="rId32"/>
-    <p:sldId id="434" r:id="rId33"/>
+    <p:sldId id="661" r:id="rId11"/>
+    <p:sldId id="658" r:id="rId12"/>
+    <p:sldId id="653" r:id="rId13"/>
+    <p:sldId id="441" r:id="rId14"/>
+    <p:sldId id="337" r:id="rId15"/>
+    <p:sldId id="419" r:id="rId16"/>
+    <p:sldId id="444" r:id="rId17"/>
+    <p:sldId id="338" r:id="rId18"/>
+    <p:sldId id="447" r:id="rId19"/>
+    <p:sldId id="382" r:id="rId20"/>
+    <p:sldId id="418" r:id="rId21"/>
+    <p:sldId id="385" r:id="rId22"/>
+    <p:sldId id="359" r:id="rId23"/>
+    <p:sldId id="386" r:id="rId24"/>
+    <p:sldId id="383" r:id="rId25"/>
+    <p:sldId id="388" r:id="rId26"/>
+    <p:sldId id="420" r:id="rId27"/>
+    <p:sldId id="421" r:id="rId28"/>
+    <p:sldId id="448" r:id="rId29"/>
+    <p:sldId id="427" r:id="rId30"/>
+    <p:sldId id="371" r:id="rId31"/>
+    <p:sldId id="417" r:id="rId32"/>
+    <p:sldId id="370" r:id="rId33"/>
+    <p:sldId id="434" r:id="rId34"/>
   </p:sldIdLst>
   <p:sldSz cx="12192000" cy="6858000"/>
   <p:notesSz cx="6858000" cy="9144000"/>
@@ -1537,7 +1538,7 @@
             <a:fld id="{E592D5FE-85CA-40E6-8273-48A5F35DE016}" type="slidenum">
               <a:rPr lang="en-US" smtClean="0"/>
               <a:pPr/>
-              <a:t>17</a:t>
+              <a:t>18</a:t>
             </a:fld>
             <a:endParaRPr lang="en-US"/>
           </a:p>
@@ -5101,7 +5102,7 @@
           <a:p>
             <a:r>
               <a:rPr lang="en-CA" dirty="0"/>
-              <a:t>Oct. 16, 2018</a:t>
+              <a:t>Oct. 17, 2018</a:t>
             </a:r>
           </a:p>
           <a:p>
@@ -5112,12 +5113,8 @@
           </a:p>
           <a:p>
             <a:r>
-              <a:rPr lang="en-CA"/>
-              <a:t>SNOMED Day </a:t>
-            </a:r>
-            <a:r>
               <a:rPr lang="en-CA" dirty="0"/>
-              <a:t>of the Dev</a:t>
+              <a:t>SNOMED Day of the Dev</a:t>
             </a:r>
           </a:p>
           <a:p>
@@ -5157,10 +5154,10 @@
       </p:grpSpPr>
       <p:sp>
         <p:nvSpPr>
-          <p:cNvPr id="5" name="Title 4">
+          <p:cNvPr id="2" name="Title 1">
             <a:extLst>
               <a:ext uri="{FF2B5EF4-FFF2-40B4-BE49-F238E27FC236}">
-                <a16:creationId xmlns:a16="http://schemas.microsoft.com/office/drawing/2014/main" id="{712EDA70-681D-4DC9-8D5C-397B47BE0DE7}"/>
+                <a16:creationId xmlns:a16="http://schemas.microsoft.com/office/drawing/2014/main" id="{49BC3AB6-7638-4D74-A155-E9E5EA1ADAE9}"/>
               </a:ext>
             </a:extLst>
           </p:cNvPr>
@@ -5178,17 +5175,17 @@
           <a:p>
             <a:r>
               <a:rPr lang="en-CA" dirty="0"/>
-              <a:t>HANDS ON Terminology Services</a:t>
-            </a:r>
-          </a:p>
-        </p:txBody>
-      </p:sp>
-      <p:sp>
-        <p:nvSpPr>
-          <p:cNvPr id="6" name="Text Placeholder 5">
+              <a:t>Don’t forget to escape URLs</a:t>
+            </a:r>
+          </a:p>
+        </p:txBody>
+      </p:sp>
+      <p:sp>
+        <p:nvSpPr>
+          <p:cNvPr id="3" name="Content Placeholder 2">
             <a:extLst>
               <a:ext uri="{FF2B5EF4-FFF2-40B4-BE49-F238E27FC236}">
-                <a16:creationId xmlns:a16="http://schemas.microsoft.com/office/drawing/2014/main" id="{0431A6A8-0089-4825-B63D-0407B3B30B20}"/>
+                <a16:creationId xmlns:a16="http://schemas.microsoft.com/office/drawing/2014/main" id="{25EE27BD-7D02-4C66-BA2D-667C2B6836AB}"/>
               </a:ext>
             </a:extLst>
           </p:cNvPr>
@@ -5196,7 +5193,7 @@
             <a:spLocks noGrp="1"/>
           </p:cNvSpPr>
           <p:nvPr>
-            <p:ph type="body" idx="1"/>
+            <p:ph idx="1"/>
           </p:nvPr>
         </p:nvSpPr>
         <p:spPr/>
@@ -5204,7 +5201,55 @@
           <a:bodyPr/>
           <a:lstStyle/>
           <a:p>
-            <a:endParaRPr lang="en-CA"/>
+            <a:r>
+              <a:rPr lang="en-CA" sz="3200" dirty="0" err="1">
+                <a:solidFill>
+                  <a:srgbClr val="00B0F0"/>
+                </a:solidFill>
+              </a:rPr>
+              <a:t>Condition?code:below</a:t>
+            </a:r>
+            <a:r>
+              <a:rPr lang="en-CA" sz="3200" dirty="0">
+                <a:solidFill>
+                  <a:srgbClr val="00B0F0"/>
+                </a:solidFill>
+              </a:rPr>
+              <a:t>=http://snomed.info/sct|73211009</a:t>
+            </a:r>
+          </a:p>
+          <a:p>
+            <a:endParaRPr lang="en-CA" dirty="0"/>
+          </a:p>
+          <a:p>
+            <a:r>
+              <a:rPr lang="en-CA" dirty="0"/>
+              <a:t>is actually</a:t>
+            </a:r>
+          </a:p>
+          <a:p>
+            <a:endParaRPr lang="en-CA" dirty="0"/>
+          </a:p>
+          <a:p>
+            <a:r>
+              <a:rPr lang="en-CA" sz="3200" dirty="0" err="1">
+                <a:solidFill>
+                  <a:srgbClr val="00B0F0"/>
+                </a:solidFill>
+              </a:rPr>
+              <a:t>Condition?code:below</a:t>
+            </a:r>
+            <a:r>
+              <a:rPr lang="en-CA" sz="3200">
+                <a:solidFill>
+                  <a:srgbClr val="00B0F0"/>
+                </a:solidFill>
+              </a:rPr>
+              <a:t>=http%3A//snomed.info/sct|73211009</a:t>
+            </a:r>
+          </a:p>
+          <a:p>
+            <a:endParaRPr lang="en-CA" dirty="0"/>
           </a:p>
         </p:txBody>
       </p:sp>
@@ -5213,7 +5258,7 @@
           <p:cNvPr id="4" name="Slide Number Placeholder 3">
             <a:extLst>
               <a:ext uri="{FF2B5EF4-FFF2-40B4-BE49-F238E27FC236}">
-                <a16:creationId xmlns:a16="http://schemas.microsoft.com/office/drawing/2014/main" id="{A0EAECE6-1022-4D4E-A73E-920DA71C7BA6}"/>
+                <a16:creationId xmlns:a16="http://schemas.microsoft.com/office/drawing/2014/main" id="{90326421-2D01-4501-93D4-805D37DDDE4B}"/>
               </a:ext>
             </a:extLst>
           </p:cNvPr>
@@ -5241,7 +5286,7 @@
     </p:spTree>
     <p:extLst>
       <p:ext uri="{BB962C8B-B14F-4D97-AF65-F5344CB8AC3E}">
-        <p14:creationId xmlns:p14="http://schemas.microsoft.com/office/powerpoint/2010/main" val="3227153206"/>
+        <p14:creationId xmlns:p14="http://schemas.microsoft.com/office/powerpoint/2010/main" val="3929888475"/>
       </p:ext>
     </p:extLst>
   </p:cSld>
@@ -5270,10 +5315,10 @@
       </p:grpSpPr>
       <p:sp>
         <p:nvSpPr>
-          <p:cNvPr id="2" name="Title 1">
+          <p:cNvPr id="5" name="Title 4">
             <a:extLst>
               <a:ext uri="{FF2B5EF4-FFF2-40B4-BE49-F238E27FC236}">
-                <a16:creationId xmlns:a16="http://schemas.microsoft.com/office/drawing/2014/main" id="{26BD89AD-7B62-48CF-BD1D-29A367709DCB}"/>
+                <a16:creationId xmlns:a16="http://schemas.microsoft.com/office/drawing/2014/main" id="{712EDA70-681D-4DC9-8D5C-397B47BE0DE7}"/>
               </a:ext>
             </a:extLst>
           </p:cNvPr>
@@ -5291,17 +5336,17 @@
           <a:p>
             <a:r>
               <a:rPr lang="en-CA" dirty="0"/>
-              <a:t>Search examples</a:t>
-            </a:r>
-          </a:p>
-        </p:txBody>
-      </p:sp>
-      <p:sp>
-        <p:nvSpPr>
-          <p:cNvPr id="3" name="Content Placeholder 2">
+              <a:t>HANDS ON Terminology Services</a:t>
+            </a:r>
+          </a:p>
+        </p:txBody>
+      </p:sp>
+      <p:sp>
+        <p:nvSpPr>
+          <p:cNvPr id="6" name="Text Placeholder 5">
             <a:extLst>
               <a:ext uri="{FF2B5EF4-FFF2-40B4-BE49-F238E27FC236}">
-                <a16:creationId xmlns:a16="http://schemas.microsoft.com/office/drawing/2014/main" id="{79D1AC37-511F-436E-A064-C8754CB0EF3C}"/>
+                <a16:creationId xmlns:a16="http://schemas.microsoft.com/office/drawing/2014/main" id="{0431A6A8-0089-4825-B63D-0407B3B30B20}"/>
               </a:ext>
             </a:extLst>
           </p:cNvPr>
@@ -5309,7 +5354,7 @@
             <a:spLocks noGrp="1"/>
           </p:cNvSpPr>
           <p:nvPr>
-            <p:ph idx="1"/>
+            <p:ph type="body" idx="1"/>
           </p:nvPr>
         </p:nvSpPr>
         <p:spPr/>
@@ -5317,115 +5362,7 @@
           <a:bodyPr/>
           <a:lstStyle/>
           <a:p>
-            <a:r>
-              <a:rPr lang="en-CA" sz="2800" dirty="0"/>
-              <a:t>All conditions with a code of “Diabetes mellitus (disorder)”</a:t>
-            </a:r>
-          </a:p>
-          <a:p>
-            <a:pPr lvl="1"/>
-            <a:r>
-              <a:rPr lang="en-CA" sz="2400" dirty="0" err="1">
-                <a:solidFill>
-                  <a:srgbClr val="00B0F0"/>
-                </a:solidFill>
-              </a:rPr>
-              <a:t>Condition?code:below</a:t>
-            </a:r>
-            <a:r>
-              <a:rPr lang="en-CA" sz="2400" dirty="0">
-                <a:solidFill>
-                  <a:srgbClr val="00B0F0"/>
-                </a:solidFill>
-              </a:rPr>
-              <a:t>=http://snomed.info/sct|73211009</a:t>
-            </a:r>
-          </a:p>
-          <a:p>
-            <a:r>
-              <a:rPr lang="en-CA" sz="2800" dirty="0"/>
-              <a:t>All female patients</a:t>
-            </a:r>
-          </a:p>
-          <a:p>
-            <a:pPr lvl="1"/>
-            <a:r>
-              <a:rPr lang="en-CA" sz="2400" dirty="0" err="1">
-                <a:solidFill>
-                  <a:srgbClr val="00B0F0"/>
-                </a:solidFill>
-              </a:rPr>
-              <a:t>Patient?gender</a:t>
-            </a:r>
-            <a:r>
-              <a:rPr lang="en-CA" sz="2400" dirty="0">
-                <a:solidFill>
-                  <a:srgbClr val="00B0F0"/>
-                </a:solidFill>
-              </a:rPr>
-              <a:t>=female</a:t>
-            </a:r>
-          </a:p>
-          <a:p>
-            <a:pPr lvl="1"/>
-            <a:r>
-              <a:rPr lang="en-CA" sz="2400" dirty="0"/>
-              <a:t>No need to specify code system – it’s fixed</a:t>
-            </a:r>
-          </a:p>
-          <a:p>
-            <a:r>
-              <a:rPr lang="en-CA" sz="2800" dirty="0"/>
-              <a:t>Observations whose display value or ‘text’ element contains ‘systolic’</a:t>
-            </a:r>
-          </a:p>
-          <a:p>
-            <a:pPr lvl="1"/>
-            <a:r>
-              <a:rPr lang="en-CA" sz="2400" dirty="0" err="1">
-                <a:solidFill>
-                  <a:srgbClr val="00B0F0"/>
-                </a:solidFill>
-              </a:rPr>
-              <a:t>Observation?code:text</a:t>
-            </a:r>
-            <a:r>
-              <a:rPr lang="en-CA" sz="2400" dirty="0">
-                <a:solidFill>
-                  <a:srgbClr val="00B0F0"/>
-                </a:solidFill>
-              </a:rPr>
-              <a:t>=systolic</a:t>
-            </a:r>
-          </a:p>
-          <a:p>
-            <a:r>
-              <a:rPr lang="en-CA" sz="2800" dirty="0"/>
-              <a:t>All procedures whose code falls within the specified value set</a:t>
-            </a:r>
-          </a:p>
-          <a:p>
-            <a:pPr lvl="1"/>
-            <a:r>
-              <a:rPr lang="en-CA" sz="2400" dirty="0" err="1">
-                <a:solidFill>
-                  <a:srgbClr val="00B0F0"/>
-                </a:solidFill>
-              </a:rPr>
-              <a:t>Procedure?code:in</a:t>
-            </a:r>
-            <a:r>
-              <a:rPr lang="en-CA" sz="2400" dirty="0">
-                <a:solidFill>
-                  <a:srgbClr val="00B0F0"/>
-                </a:solidFill>
-              </a:rPr>
-              <a:t>=http://somewhere.org/ValueSet/proc1</a:t>
-            </a:r>
-          </a:p>
-          <a:p>
-            <a:pPr lvl="1"/>
-            <a:endParaRPr lang="en-CA" sz="2400" dirty="0"/>
+            <a:endParaRPr lang="en-CA"/>
           </a:p>
         </p:txBody>
       </p:sp>
@@ -5434,7 +5371,7 @@
           <p:cNvPr id="4" name="Slide Number Placeholder 3">
             <a:extLst>
               <a:ext uri="{FF2B5EF4-FFF2-40B4-BE49-F238E27FC236}">
-                <a16:creationId xmlns:a16="http://schemas.microsoft.com/office/drawing/2014/main" id="{A6AEE4D5-8930-490D-BA88-6193576309B8}"/>
+                <a16:creationId xmlns:a16="http://schemas.microsoft.com/office/drawing/2014/main" id="{A0EAECE6-1022-4D4E-A73E-920DA71C7BA6}"/>
               </a:ext>
             </a:extLst>
           </p:cNvPr>
@@ -5462,7 +5399,7 @@
     </p:spTree>
     <p:extLst>
       <p:ext uri="{BB962C8B-B14F-4D97-AF65-F5344CB8AC3E}">
-        <p14:creationId xmlns:p14="http://schemas.microsoft.com/office/powerpoint/2010/main" val="1298743744"/>
+        <p14:creationId xmlns:p14="http://schemas.microsoft.com/office/powerpoint/2010/main" val="3227153206"/>
       </p:ext>
     </p:extLst>
   </p:cSld>
@@ -5491,7 +5428,13 @@
       </p:grpSpPr>
       <p:sp>
         <p:nvSpPr>
-          <p:cNvPr id="2" name="Title 1"/>
+          <p:cNvPr id="2" name="Title 1">
+            <a:extLst>
+              <a:ext uri="{FF2B5EF4-FFF2-40B4-BE49-F238E27FC236}">
+                <a16:creationId xmlns:a16="http://schemas.microsoft.com/office/drawing/2014/main" id="{26BD89AD-7B62-48CF-BD1D-29A367709DCB}"/>
+              </a:ext>
+            </a:extLst>
+          </p:cNvPr>
           <p:cNvSpPr>
             <a:spLocks noGrp="1"/>
           </p:cNvSpPr>
@@ -5505,15 +5448,21 @@
           <a:lstStyle/>
           <a:p>
             <a:r>
-              <a:rPr lang="en-US" dirty="0"/>
-              <a:t>SNOMED CT in FHIR (cont.)</a:t>
-            </a:r>
-          </a:p>
-        </p:txBody>
-      </p:sp>
-      <p:sp>
-        <p:nvSpPr>
-          <p:cNvPr id="3" name="Content Placeholder 2"/>
+              <a:rPr lang="en-CA" dirty="0"/>
+              <a:t>Search examples</a:t>
+            </a:r>
+          </a:p>
+        </p:txBody>
+      </p:sp>
+      <p:sp>
+        <p:nvSpPr>
+          <p:cNvPr id="3" name="Content Placeholder 2">
+            <a:extLst>
+              <a:ext uri="{FF2B5EF4-FFF2-40B4-BE49-F238E27FC236}">
+                <a16:creationId xmlns:a16="http://schemas.microsoft.com/office/drawing/2014/main" id="{79D1AC37-511F-436E-A064-C8754CB0EF3C}"/>
+              </a:ext>
+            </a:extLst>
+          </p:cNvPr>
           <p:cNvSpPr>
             <a:spLocks noGrp="1"/>
           </p:cNvSpPr>
@@ -5521,167 +5470,137 @@
             <p:ph idx="1"/>
           </p:nvPr>
         </p:nvSpPr>
-        <p:spPr>
-          <a:xfrm>
-            <a:off x="508000" y="1708081"/>
-            <a:ext cx="11176000" cy="4624536"/>
-          </a:xfrm>
-        </p:spPr>
+        <p:spPr/>
         <p:txBody>
           <a:bodyPr/>
           <a:lstStyle/>
           <a:p>
             <a:r>
-              <a:rPr lang="en-US" dirty="0"/>
-              <a:t>Implicit Value Sets (use “</a:t>
-            </a:r>
-            <a:r>
-              <a:rPr lang="en-US" dirty="0" err="1"/>
-              <a:t>code:in</a:t>
-            </a:r>
-            <a:r>
-              <a:rPr lang="en-US" dirty="0"/>
-              <a:t>” +)</a:t>
+              <a:rPr lang="en-CA" sz="2800" dirty="0"/>
+              <a:t>All conditions with a code of “Diabetes mellitus (disorder)”</a:t>
             </a:r>
           </a:p>
           <a:p>
             <a:pPr lvl="1"/>
             <a:r>
-              <a:rPr lang="en-US" dirty="0"/>
-              <a:t>All codes: </a:t>
-            </a:r>
-            <a:r>
-              <a:rPr lang="en-US" dirty="0">
+              <a:rPr lang="en-CA" sz="2400" dirty="0" err="1">
                 <a:solidFill>
                   <a:srgbClr val="00B0F0"/>
                 </a:solidFill>
               </a:rPr>
-              <a:t>http://snomed.info/sct?fhir_vs</a:t>
-            </a:r>
-          </a:p>
-          <a:p>
-            <a:pPr lvl="1"/>
-            <a:r>
-              <a:rPr lang="en-US" dirty="0"/>
-              <a:t>By </a:t>
-            </a:r>
-            <a:r>
-              <a:rPr lang="en-US" dirty="0" err="1"/>
-              <a:t>subsumption</a:t>
-            </a:r>
-            <a:r>
-              <a:rPr lang="en-US" dirty="0"/>
-              <a:t>: </a:t>
-            </a:r>
-            <a:r>
-              <a:rPr lang="en-US" dirty="0">
+              <a:t>Condition?code:below</a:t>
+            </a:r>
+            <a:r>
+              <a:rPr lang="en-CA" sz="2400" dirty="0">
                 <a:solidFill>
                   <a:srgbClr val="00B0F0"/>
                 </a:solidFill>
               </a:rPr>
-              <a:t>http://snomed.info/sct?fhir_vs=isa/195967001</a:t>
+              <a:t>=http://snomed.info/sct|73211009</a:t>
+            </a:r>
+          </a:p>
+          <a:p>
+            <a:r>
+              <a:rPr lang="en-CA" sz="2800" dirty="0"/>
+              <a:t>All female patients</a:t>
             </a:r>
           </a:p>
           <a:p>
             <a:pPr lvl="1"/>
             <a:r>
-              <a:rPr lang="en-US" dirty="0"/>
-              <a:t>List of </a:t>
-            </a:r>
-            <a:r>
-              <a:rPr lang="en-US" dirty="0" err="1"/>
-              <a:t>refsets</a:t>
-            </a:r>
-            <a:r>
-              <a:rPr lang="en-US" dirty="0"/>
-              <a:t>: </a:t>
-            </a:r>
-            <a:r>
-              <a:rPr lang="en-US" dirty="0">
+              <a:rPr lang="en-CA" sz="2400" dirty="0" err="1">
                 <a:solidFill>
                   <a:srgbClr val="00B0F0"/>
                 </a:solidFill>
               </a:rPr>
-              <a:t>http://snomed.info/sct?fhir_vs=refset</a:t>
-            </a:r>
-          </a:p>
-          <a:p>
-            <a:pPr lvl="1"/>
-            <a:r>
-              <a:rPr lang="en-US" dirty="0"/>
-              <a:t>All codes in a </a:t>
-            </a:r>
-            <a:r>
-              <a:rPr lang="en-US" dirty="0" err="1"/>
-              <a:t>refset</a:t>
-            </a:r>
-            <a:r>
-              <a:rPr lang="en-US" dirty="0"/>
-              <a:t>: </a:t>
-            </a:r>
-            <a:r>
-              <a:rPr lang="en-US" dirty="0">
+              <a:t>Patient?gender</a:t>
+            </a:r>
+            <a:r>
+              <a:rPr lang="en-CA" sz="2400" dirty="0">
                 <a:solidFill>
                   <a:srgbClr val="00B0F0"/>
                 </a:solidFill>
               </a:rPr>
-              <a:t>http://snomed.info/sct?fhir_vs=refset/734138000</a:t>
+              <a:t>=female</a:t>
             </a:r>
           </a:p>
           <a:p>
             <a:pPr lvl="1"/>
             <a:r>
-              <a:rPr lang="en-CA" dirty="0"/>
-              <a:t>All codes with a finding site of foot:</a:t>
-            </a:r>
-            <a:br>
-              <a:rPr lang="en-CA" dirty="0"/>
-            </a:br>
-            <a:r>
-              <a:rPr lang="en-CA" dirty="0">
+              <a:rPr lang="en-CA" sz="2400" dirty="0"/>
+              <a:t>No need to specify code system – it’s fixed</a:t>
+            </a:r>
+          </a:p>
+          <a:p>
+            <a:r>
+              <a:rPr lang="en-CA" sz="2800" dirty="0"/>
+              <a:t>Observations whose display value or ‘text’ element contains ‘systolic’</a:t>
+            </a:r>
+          </a:p>
+          <a:p>
+            <a:pPr lvl="1"/>
+            <a:r>
+              <a:rPr lang="en-CA" sz="2400" dirty="0" err="1">
                 <a:solidFill>
                   <a:srgbClr val="00B0F0"/>
                 </a:solidFill>
               </a:rPr>
-              <a:t>http://snomed.info/sct?fhir_vs=ecl/*:363698007=&lt;&lt;56459004</a:t>
-            </a:r>
-          </a:p>
-          <a:p>
-            <a:r>
-              <a:rPr lang="en-US" dirty="0"/>
-              <a:t>Implicit </a:t>
-            </a:r>
-            <a:r>
-              <a:rPr lang="en-US" dirty="0" err="1"/>
-              <a:t>ConceptMaps</a:t>
-            </a:r>
-            <a:endParaRPr lang="en-US" dirty="0"/>
-          </a:p>
-          <a:p>
-            <a:pPr lvl="1"/>
-            <a:r>
-              <a:rPr lang="en-US" dirty="0"/>
-              <a:t>Historical associations: (SAME AS) </a:t>
-            </a:r>
-            <a:r>
-              <a:rPr lang="en-US" dirty="0">
+              <a:t>Observation?code:text</a:t>
+            </a:r>
+            <a:r>
+              <a:rPr lang="en-CA" sz="2400" dirty="0">
                 <a:solidFill>
                   <a:srgbClr val="00B0F0"/>
                 </a:solidFill>
               </a:rPr>
-              <a:t>http://snomed.info/sct?fhir_cm=900000000000527005</a:t>
-            </a:r>
-          </a:p>
-        </p:txBody>
-      </p:sp>
-      <p:sp>
-        <p:nvSpPr>
-          <p:cNvPr id="4" name="Slide Number Placeholder 3"/>
-          <p:cNvSpPr>
-            <a:spLocks noGrp="1"/>
-          </p:cNvSpPr>
-          <p:nvPr>
-            <p:ph type="sldNum" sz="quarter" idx="4"/>
+              <a:t>=systolic</a:t>
+            </a:r>
+          </a:p>
+          <a:p>
+            <a:r>
+              <a:rPr lang="en-CA" sz="2800" dirty="0"/>
+              <a:t>All procedures whose code falls within the specified value set</a:t>
+            </a:r>
+          </a:p>
+          <a:p>
+            <a:pPr lvl="1"/>
+            <a:r>
+              <a:rPr lang="en-CA" sz="2400" dirty="0" err="1">
+                <a:solidFill>
+                  <a:srgbClr val="00B0F0"/>
+                </a:solidFill>
+              </a:rPr>
+              <a:t>Procedure?code:in</a:t>
+            </a:r>
+            <a:r>
+              <a:rPr lang="en-CA" sz="2400" dirty="0">
+                <a:solidFill>
+                  <a:srgbClr val="00B0F0"/>
+                </a:solidFill>
+              </a:rPr>
+              <a:t>=http://somewhere.org/ValueSet/proc1</a:t>
+            </a:r>
+          </a:p>
+          <a:p>
+            <a:pPr lvl="1"/>
+            <a:endParaRPr lang="en-CA" sz="2400" dirty="0"/>
+          </a:p>
+        </p:txBody>
+      </p:sp>
+      <p:sp>
+        <p:nvSpPr>
+          <p:cNvPr id="4" name="Slide Number Placeholder 3">
+            <a:extLst>
+              <a:ext uri="{FF2B5EF4-FFF2-40B4-BE49-F238E27FC236}">
+                <a16:creationId xmlns:a16="http://schemas.microsoft.com/office/drawing/2014/main" id="{A6AEE4D5-8930-490D-BA88-6193576309B8}"/>
+              </a:ext>
+            </a:extLst>
+          </p:cNvPr>
+          <p:cNvSpPr>
+            <a:spLocks noGrp="1"/>
+          </p:cNvSpPr>
+          <p:nvPr>
+            <p:ph type="sldNum" sz="quarter" idx="11"/>
           </p:nvPr>
         </p:nvSpPr>
         <p:spPr/>
@@ -5689,19 +5608,19 @@
           <a:bodyPr/>
           <a:lstStyle/>
           <a:p>
-            <a:fld id="{5CC3E5C4-3E2B-40F1-9F2B-C46CEB0C88DF}" type="slidenum">
-              <a:rPr lang="en-CA" smtClean="0"/>
+            <a:fld id="{DD8FDF0E-2772-4D89-9F72-F3CB15D8B8AB}" type="slidenum">
+              <a:rPr lang="en-US" smtClean="0"/>
               <a:pPr/>
               <a:t>12</a:t>
             </a:fld>
-            <a:endParaRPr lang="en-CA"/>
+            <a:endParaRPr lang="en-US" dirty="0"/>
           </a:p>
         </p:txBody>
       </p:sp>
     </p:spTree>
     <p:extLst>
       <p:ext uri="{BB962C8B-B14F-4D97-AF65-F5344CB8AC3E}">
-        <p14:creationId xmlns:p14="http://schemas.microsoft.com/office/powerpoint/2010/main" val="179285531"/>
+        <p14:creationId xmlns:p14="http://schemas.microsoft.com/office/powerpoint/2010/main" val="1298743744"/>
       </p:ext>
     </p:extLst>
   </p:cSld>
@@ -5744,8 +5663,8 @@
           <a:lstStyle/>
           <a:p>
             <a:r>
-              <a:rPr lang="en-CA"/>
-              <a:t>$expand</a:t>
+              <a:rPr lang="en-US" dirty="0"/>
+              <a:t>SNOMED CT in FHIR (cont.)</a:t>
             </a:r>
           </a:p>
         </p:txBody>
@@ -5760,98 +5679,155 @@
             <p:ph idx="1"/>
           </p:nvPr>
         </p:nvSpPr>
-        <p:spPr/>
+        <p:spPr>
+          <a:xfrm>
+            <a:off x="508000" y="1708081"/>
+            <a:ext cx="11176000" cy="4624536"/>
+          </a:xfrm>
+        </p:spPr>
         <p:txBody>
           <a:bodyPr/>
           <a:lstStyle/>
           <a:p>
             <a:r>
+              <a:rPr lang="en-US" dirty="0"/>
+              <a:t>Implicit Value Sets (use “</a:t>
+            </a:r>
+            <a:r>
+              <a:rPr lang="en-US" dirty="0" err="1"/>
+              <a:t>code:in</a:t>
+            </a:r>
+            <a:r>
+              <a:rPr lang="en-US" dirty="0"/>
+              <a:t>” +)</a:t>
+            </a:r>
+          </a:p>
+          <a:p>
+            <a:pPr lvl="1"/>
+            <a:r>
+              <a:rPr lang="en-US" dirty="0"/>
+              <a:t>All codes: </a:t>
+            </a:r>
+            <a:r>
+              <a:rPr lang="en-US" dirty="0">
+                <a:solidFill>
+                  <a:srgbClr val="00B0F0"/>
+                </a:solidFill>
+              </a:rPr>
+              <a:t>http://snomed.info/sct?fhir_vs</a:t>
+            </a:r>
+          </a:p>
+          <a:p>
+            <a:pPr lvl="1"/>
+            <a:r>
+              <a:rPr lang="en-US" dirty="0"/>
+              <a:t>By </a:t>
+            </a:r>
+            <a:r>
+              <a:rPr lang="en-US" dirty="0" err="1"/>
+              <a:t>subsumption</a:t>
+            </a:r>
+            <a:r>
+              <a:rPr lang="en-US" dirty="0"/>
+              <a:t>: </a:t>
+            </a:r>
+            <a:r>
+              <a:rPr lang="en-US" dirty="0">
+                <a:solidFill>
+                  <a:srgbClr val="00B0F0"/>
+                </a:solidFill>
+              </a:rPr>
+              <a:t>http://snomed.info/sct?fhir_vs=isa/195967001</a:t>
+            </a:r>
+          </a:p>
+          <a:p>
+            <a:pPr lvl="1"/>
+            <a:r>
+              <a:rPr lang="en-US" dirty="0"/>
+              <a:t>List of </a:t>
+            </a:r>
+            <a:r>
+              <a:rPr lang="en-US" dirty="0" err="1"/>
+              <a:t>refsets</a:t>
+            </a:r>
+            <a:r>
+              <a:rPr lang="en-US" dirty="0"/>
+              <a:t>: </a:t>
+            </a:r>
+            <a:r>
+              <a:rPr lang="en-US" dirty="0">
+                <a:solidFill>
+                  <a:srgbClr val="00B0F0"/>
+                </a:solidFill>
+              </a:rPr>
+              <a:t>http://snomed.info/sct?fhir_vs=refset</a:t>
+            </a:r>
+          </a:p>
+          <a:p>
+            <a:pPr lvl="1"/>
+            <a:r>
+              <a:rPr lang="en-US" dirty="0"/>
+              <a:t>All codes in a </a:t>
+            </a:r>
+            <a:r>
+              <a:rPr lang="en-US" dirty="0" err="1"/>
+              <a:t>refset</a:t>
+            </a:r>
+            <a:r>
+              <a:rPr lang="en-US" dirty="0"/>
+              <a:t>: </a:t>
+            </a:r>
+            <a:r>
+              <a:rPr lang="en-US" dirty="0">
+                <a:solidFill>
+                  <a:srgbClr val="00B0F0"/>
+                </a:solidFill>
+              </a:rPr>
+              <a:t>http://snomed.info/sct?fhir_vs=refset/734138000</a:t>
+            </a:r>
+          </a:p>
+          <a:p>
+            <a:pPr lvl="1"/>
+            <a:r>
               <a:rPr lang="en-CA" dirty="0"/>
-              <a:t>Takes a </a:t>
-            </a:r>
-            <a:r>
-              <a:rPr lang="en-CA" dirty="0" err="1"/>
-              <a:t>ValueSet</a:t>
-            </a:r>
-            <a:r>
+              <a:t>All codes with a finding site of foot:</a:t>
+            </a:r>
+            <a:br>
               <a:rPr lang="en-CA" dirty="0"/>
-              <a:t> reference or resource and returns another </a:t>
-            </a:r>
-            <a:r>
-              <a:rPr lang="en-CA" dirty="0" err="1"/>
-              <a:t>ValueSet</a:t>
-            </a:r>
-            <a:r>
-              <a:rPr lang="en-CA" dirty="0"/>
-              <a:t> resource containing the expansion (code set)</a:t>
-            </a:r>
+            </a:br>
+            <a:r>
+              <a:rPr lang="en-CA" dirty="0">
+                <a:solidFill>
+                  <a:srgbClr val="00B0F0"/>
+                </a:solidFill>
+              </a:rPr>
+              <a:t>http://snomed.info/sct?fhir_vs=ecl/*:363698007=&lt;&lt;56459004</a:t>
+            </a:r>
+          </a:p>
+          <a:p>
+            <a:r>
+              <a:rPr lang="en-US" dirty="0"/>
+              <a:t>Implicit </a:t>
+            </a:r>
+            <a:r>
+              <a:rPr lang="en-US" dirty="0" err="1"/>
+              <a:t>ConceptMaps</a:t>
+            </a:r>
+            <a:endParaRPr lang="en-US" dirty="0"/>
           </a:p>
           <a:p>
             <a:pPr lvl="1"/>
             <a:r>
-              <a:rPr lang="en-CA" dirty="0"/>
-              <a:t>Default is the current expansion (as of “now”)</a:t>
-            </a:r>
-          </a:p>
-          <a:p>
-            <a:pPr lvl="1"/>
-            <a:r>
-              <a:rPr lang="en-CA" dirty="0"/>
-              <a:t>GET/POST http://....ValueSet/someId$expand (instance)</a:t>
-            </a:r>
-          </a:p>
-          <a:p>
-            <a:pPr lvl="1"/>
-            <a:r>
-              <a:rPr lang="en-CA" dirty="0"/>
-              <a:t>GET/POST http://...ValueSet$expand?url=[someURL] (type)</a:t>
-            </a:r>
-          </a:p>
-          <a:p>
-            <a:pPr lvl="1"/>
-            <a:r>
-              <a:rPr lang="en-CA" dirty="0"/>
-              <a:t>POST http://...</a:t>
-            </a:r>
-            <a:r>
-              <a:rPr lang="en-CA" dirty="0" err="1"/>
-              <a:t>ValueSet</a:t>
-            </a:r>
-            <a:r>
-              <a:rPr lang="en-CA" dirty="0"/>
-              <a:t> (pass </a:t>
-            </a:r>
-            <a:r>
-              <a:rPr lang="en-CA" dirty="0" err="1"/>
-              <a:t>ValueSet</a:t>
-            </a:r>
-            <a:r>
-              <a:rPr lang="en-CA" dirty="0"/>
-              <a:t> in body)</a:t>
-            </a:r>
-          </a:p>
-          <a:p>
-            <a:r>
-              <a:rPr lang="en-CA" dirty="0"/>
-              <a:t>Some additional parameters include:</a:t>
-            </a:r>
-          </a:p>
-          <a:p>
-            <a:pPr lvl="1"/>
-            <a:r>
-              <a:rPr lang="en-CA" b="1" dirty="0"/>
-              <a:t>filter</a:t>
-            </a:r>
-            <a:r>
-              <a:rPr lang="en-CA" dirty="0"/>
-              <a:t>: Only include concepts with display name containing string</a:t>
-            </a:r>
-          </a:p>
-          <a:p>
-            <a:pPr lvl="2"/>
-            <a:r>
-              <a:rPr lang="en-CA" dirty="0"/>
-              <a:t>This is a good way to search for a code</a:t>
+              <a:rPr lang="en-US" dirty="0"/>
+              <a:t>Historical associations: (SAME AS) </a:t>
+            </a:r>
+            <a:r>
+              <a:rPr lang="en-US" dirty="0">
+                <a:solidFill>
+                  <a:srgbClr val="00B0F0"/>
+                </a:solidFill>
+              </a:rPr>
+              <a:t>http://snomed.info/sct?fhir_cm=900000000000527005</a:t>
             </a:r>
           </a:p>
         </p:txBody>
@@ -5863,7 +5839,7 @@
             <a:spLocks noGrp="1"/>
           </p:cNvSpPr>
           <p:nvPr>
-            <p:ph type="sldNum" sz="quarter" idx="4294967295"/>
+            <p:ph type="sldNum" sz="quarter" idx="4"/>
           </p:nvPr>
         </p:nvSpPr>
         <p:spPr/>
@@ -5883,7 +5859,7 @@
     </p:spTree>
     <p:extLst>
       <p:ext uri="{BB962C8B-B14F-4D97-AF65-F5344CB8AC3E}">
-        <p14:creationId xmlns:p14="http://schemas.microsoft.com/office/powerpoint/2010/main" val="2103426083"/>
+        <p14:creationId xmlns:p14="http://schemas.microsoft.com/office/powerpoint/2010/main" val="179285531"/>
       </p:ext>
     </p:extLst>
   </p:cSld>
@@ -5927,7 +5903,7 @@
           <a:p>
             <a:r>
               <a:rPr lang="en-CA"/>
-              <a:t>$expand (cont.)</a:t>
+              <a:t>$expand</a:t>
             </a:r>
           </a:p>
         </p:txBody>
@@ -5947,79 +5923,9 @@
           <a:bodyPr/>
           <a:lstStyle/>
           <a:p>
-            <a:pPr lvl="1"/>
-            <a:r>
-              <a:rPr lang="en-CA" b="1" dirty="0"/>
-              <a:t>date</a:t>
-            </a:r>
             <a:r>
               <a:rPr lang="en-CA" dirty="0"/>
-              <a:t>: Generate the expansion as of the specified date</a:t>
-            </a:r>
-          </a:p>
-          <a:p>
-            <a:r>
-              <a:rPr lang="en-CA" dirty="0"/>
-              <a:t>$expand operation parameters</a:t>
-            </a:r>
-          </a:p>
-          <a:p>
-            <a:pPr lvl="1"/>
-            <a:r>
-              <a:rPr lang="en-CA" dirty="0" err="1"/>
-              <a:t>url</a:t>
-            </a:r>
-            <a:r>
-              <a:rPr lang="en-CA" dirty="0"/>
-              <a:t>, </a:t>
-            </a:r>
-            <a:r>
-              <a:rPr lang="en-CA" dirty="0" err="1"/>
-              <a:t>valueSet</a:t>
-            </a:r>
-            <a:r>
-              <a:rPr lang="en-CA" dirty="0"/>
-              <a:t>, </a:t>
-            </a:r>
-            <a:r>
-              <a:rPr lang="en-CA" dirty="0" err="1"/>
-              <a:t>valueSetVersion</a:t>
-            </a:r>
-            <a:r>
-              <a:rPr lang="en-CA" dirty="0"/>
-              <a:t>, filter, data, </a:t>
-            </a:r>
-            <a:r>
-              <a:rPr lang="en-CA" dirty="0" err="1"/>
-              <a:t>includeDesignations</a:t>
-            </a:r>
-            <a:r>
-              <a:rPr lang="en-CA" dirty="0"/>
-              <a:t>, </a:t>
-            </a:r>
-            <a:r>
-              <a:rPr lang="en-CA" dirty="0" err="1"/>
-              <a:t>activeOnly</a:t>
-            </a:r>
-            <a:r>
-              <a:rPr lang="en-CA" dirty="0"/>
-              <a:t>, </a:t>
-            </a:r>
-            <a:r>
-              <a:rPr lang="en-US" dirty="0" err="1"/>
-              <a:t>excludePostCoordinated</a:t>
-            </a:r>
-            <a:r>
-              <a:rPr lang="en-US" dirty="0"/>
-              <a:t> … , etc.</a:t>
-            </a:r>
-            <a:endParaRPr lang="en-CA" dirty="0"/>
-          </a:p>
-          <a:p>
-            <a:pPr lvl="1"/>
-            <a:r>
-              <a:rPr lang="en-CA" dirty="0"/>
-              <a:t>Used to configure the behaviour of a terminology server when it processes </a:t>
+              <a:t>Takes a </a:t>
             </a:r>
             <a:r>
               <a:rPr lang="en-CA" dirty="0" err="1"/>
@@ -6027,7 +5933,83 @@
             </a:r>
             <a:r>
               <a:rPr lang="en-CA" dirty="0"/>
-              <a:t> resources to generate expansions</a:t>
+              <a:t> reference or resource and returns another </a:t>
+            </a:r>
+            <a:r>
+              <a:rPr lang="en-CA" dirty="0" err="1"/>
+              <a:t>ValueSet</a:t>
+            </a:r>
+            <a:r>
+              <a:rPr lang="en-CA" dirty="0"/>
+              <a:t> resource containing the expansion (code set)</a:t>
+            </a:r>
+          </a:p>
+          <a:p>
+            <a:pPr lvl="1"/>
+            <a:r>
+              <a:rPr lang="en-CA" dirty="0"/>
+              <a:t>Default is the current expansion (as of “now”)</a:t>
+            </a:r>
+          </a:p>
+          <a:p>
+            <a:pPr lvl="1"/>
+            <a:r>
+              <a:rPr lang="en-CA" dirty="0"/>
+              <a:t>GET/POST http://....ValueSet/someId$expand (instance)</a:t>
+            </a:r>
+          </a:p>
+          <a:p>
+            <a:pPr lvl="1"/>
+            <a:r>
+              <a:rPr lang="en-CA" dirty="0"/>
+              <a:t>GET/POST http://...ValueSet$expand?url=[someURL] (type)</a:t>
+            </a:r>
+          </a:p>
+          <a:p>
+            <a:pPr lvl="1"/>
+            <a:r>
+              <a:rPr lang="en-CA" dirty="0"/>
+              <a:t>POST http://...</a:t>
+            </a:r>
+            <a:r>
+              <a:rPr lang="en-CA" dirty="0" err="1"/>
+              <a:t>ValueSet</a:t>
+            </a:r>
+            <a:r>
+              <a:rPr lang="en-CA" dirty="0"/>
+              <a:t> (pass </a:t>
+            </a:r>
+            <a:r>
+              <a:rPr lang="en-CA" dirty="0" err="1"/>
+              <a:t>ValueSet</a:t>
+            </a:r>
+            <a:r>
+              <a:rPr lang="en-CA" dirty="0"/>
+              <a:t> in body)</a:t>
+            </a:r>
+          </a:p>
+          <a:p>
+            <a:r>
+              <a:rPr lang="en-CA" dirty="0"/>
+              <a:t>Some additional parameters include:</a:t>
+            </a:r>
+          </a:p>
+          <a:p>
+            <a:pPr lvl="1"/>
+            <a:r>
+              <a:rPr lang="en-CA" b="1" dirty="0"/>
+              <a:t>filter</a:t>
+            </a:r>
+            <a:r>
+              <a:rPr lang="en-CA" dirty="0"/>
+              <a:t>: Only include concepts with display name containing string</a:t>
+            </a:r>
+          </a:p>
+          <a:p>
+            <a:pPr lvl="2"/>
+            <a:r>
+              <a:rPr lang="en-CA" dirty="0"/>
+              <a:t>This is a good way to search for a code</a:t>
             </a:r>
           </a:p>
         </p:txBody>
@@ -6059,7 +6041,7 @@
     </p:spTree>
     <p:extLst>
       <p:ext uri="{BB962C8B-B14F-4D97-AF65-F5344CB8AC3E}">
-        <p14:creationId xmlns:p14="http://schemas.microsoft.com/office/powerpoint/2010/main" val="1961729532"/>
+        <p14:creationId xmlns:p14="http://schemas.microsoft.com/office/powerpoint/2010/main" val="2103426083"/>
       </p:ext>
     </p:extLst>
   </p:cSld>
@@ -6102,91 +6084,109 @@
           <a:lstStyle/>
           <a:p>
             <a:r>
+              <a:rPr lang="en-CA"/>
+              <a:t>$expand (cont.)</a:t>
+            </a:r>
+          </a:p>
+        </p:txBody>
+      </p:sp>
+      <p:sp>
+        <p:nvSpPr>
+          <p:cNvPr id="3" name="Content Placeholder 2"/>
+          <p:cNvSpPr>
+            <a:spLocks noGrp="1"/>
+          </p:cNvSpPr>
+          <p:nvPr>
+            <p:ph idx="1"/>
+          </p:nvPr>
+        </p:nvSpPr>
+        <p:spPr/>
+        <p:txBody>
+          <a:bodyPr/>
+          <a:lstStyle/>
+          <a:p>
+            <a:pPr lvl="1"/>
+            <a:r>
+              <a:rPr lang="en-CA" b="1" dirty="0"/>
+              <a:t>date</a:t>
+            </a:r>
+            <a:r>
+              <a:rPr lang="en-CA" dirty="0"/>
+              <a:t>: Generate the expansion as of the specified date</a:t>
+            </a:r>
+          </a:p>
+          <a:p>
+            <a:r>
+              <a:rPr lang="en-CA" dirty="0"/>
+              <a:t>$expand operation parameters</a:t>
+            </a:r>
+          </a:p>
+          <a:p>
+            <a:pPr lvl="1"/>
+            <a:r>
+              <a:rPr lang="en-CA" dirty="0" err="1"/>
+              <a:t>url</a:t>
+            </a:r>
+            <a:r>
+              <a:rPr lang="en-CA" dirty="0"/>
+              <a:t>, </a:t>
+            </a:r>
+            <a:r>
+              <a:rPr lang="en-CA" dirty="0" err="1"/>
+              <a:t>valueSet</a:t>
+            </a:r>
+            <a:r>
+              <a:rPr lang="en-CA" dirty="0"/>
+              <a:t>, </a:t>
+            </a:r>
+            <a:r>
+              <a:rPr lang="en-CA" dirty="0" err="1"/>
+              <a:t>valueSetVersion</a:t>
+            </a:r>
+            <a:r>
+              <a:rPr lang="en-CA" dirty="0"/>
+              <a:t>, filter, data, </a:t>
+            </a:r>
+            <a:r>
+              <a:rPr lang="en-CA" dirty="0" err="1"/>
+              <a:t>includeDesignations</a:t>
+            </a:r>
+            <a:r>
+              <a:rPr lang="en-CA" dirty="0"/>
+              <a:t>, </a:t>
+            </a:r>
+            <a:r>
+              <a:rPr lang="en-CA" dirty="0" err="1"/>
+              <a:t>activeOnly</a:t>
+            </a:r>
+            <a:r>
+              <a:rPr lang="en-CA" dirty="0"/>
+              <a:t>, </a:t>
+            </a:r>
+            <a:r>
+              <a:rPr lang="en-US" dirty="0" err="1"/>
+              <a:t>excludePostCoordinated</a:t>
+            </a:r>
+            <a:r>
               <a:rPr lang="en-US" dirty="0"/>
-              <a:t>$expand example</a:t>
-            </a:r>
-          </a:p>
-        </p:txBody>
-      </p:sp>
-      <p:sp>
-        <p:nvSpPr>
-          <p:cNvPr id="3" name="Content Placeholder 2"/>
-          <p:cNvSpPr>
-            <a:spLocks noGrp="1"/>
-          </p:cNvSpPr>
-          <p:nvPr>
-            <p:ph idx="1"/>
-          </p:nvPr>
-        </p:nvSpPr>
-        <p:spPr/>
-        <p:txBody>
-          <a:bodyPr/>
-          <a:lstStyle/>
-          <a:p>
-            <a:r>
-              <a:rPr lang="en-US" dirty="0"/>
-              <a:t>Subtypes of “Hypertensive disorder, systemic arterial” (38341003)</a:t>
-            </a:r>
+              <a:t> … , etc.</a:t>
+            </a:r>
+            <a:endParaRPr lang="en-CA" dirty="0"/>
           </a:p>
           <a:p>
             <a:pPr lvl="1"/>
             <a:r>
-              <a:rPr lang="en-US" dirty="0"/>
-              <a:t>SNOMED CT browser </a:t>
-            </a:r>
-            <a:r>
-              <a:rPr lang="en-US" dirty="0">
-                <a:hlinkClick r:id="rId2"/>
-              </a:rPr>
-              <a:t>view</a:t>
-            </a:r>
-            <a:endParaRPr lang="en-US" dirty="0"/>
-          </a:p>
-          <a:p>
-            <a:pPr lvl="1"/>
-            <a:r>
-              <a:rPr lang="en-US" dirty="0"/>
-              <a:t>Value set definition (</a:t>
-            </a:r>
-            <a:r>
-              <a:rPr lang="en-US" dirty="0" err="1"/>
-              <a:t>intensional</a:t>
-            </a:r>
-            <a:r>
-              <a:rPr lang="en-US" dirty="0"/>
-              <a:t>): </a:t>
-            </a:r>
-            <a:r>
-              <a:rPr lang="en-US" dirty="0">
-                <a:hlinkClick r:id="rId3"/>
-              </a:rPr>
-              <a:t>https://ontoserver.csiro.au/stu3-latest/ValueSet?url=http://www.healthintersections.com.au/fhir/ValueSet/intensional-case-2</a:t>
-            </a:r>
-            <a:endParaRPr lang="en-US" dirty="0"/>
-          </a:p>
-          <a:p>
-            <a:pPr lvl="1"/>
-            <a:r>
-              <a:rPr lang="en-US" dirty="0"/>
-              <a:t>Value set expansion: </a:t>
-            </a:r>
-            <a:r>
-              <a:rPr lang="en-US" dirty="0">
-                <a:hlinkClick r:id="rId3"/>
-              </a:rPr>
-              <a:t>https://ontoserver.csiro.au/stu3-latest/ValueSet </a:t>
-            </a:r>
-            <a:r>
-              <a:rPr lang="en-US" dirty="0">
-                <a:hlinkClick r:id="rId4"/>
-              </a:rPr>
-              <a:t>/intensional-case-2/$expand</a:t>
-            </a:r>
-            <a:endParaRPr lang="en-US" dirty="0"/>
-          </a:p>
-          <a:p>
-            <a:pPr lvl="1"/>
-            <a:endParaRPr lang="en-US" dirty="0"/>
+              <a:rPr lang="en-CA" dirty="0"/>
+              <a:t>Used to configure the behaviour of a terminology server when it processes </a:t>
+            </a:r>
+            <a:r>
+              <a:rPr lang="en-CA" dirty="0" err="1"/>
+              <a:t>ValueSet</a:t>
+            </a:r>
+            <a:r>
+              <a:rPr lang="en-CA" dirty="0"/>
+              <a:t> resources to generate expansions</a:t>
+            </a:r>
           </a:p>
         </p:txBody>
       </p:sp>
@@ -6217,7 +6217,7 @@
     </p:spTree>
     <p:extLst>
       <p:ext uri="{BB962C8B-B14F-4D97-AF65-F5344CB8AC3E}">
-        <p14:creationId xmlns:p14="http://schemas.microsoft.com/office/powerpoint/2010/main" val="2500429887"/>
+        <p14:creationId xmlns:p14="http://schemas.microsoft.com/office/powerpoint/2010/main" val="1961729532"/>
       </p:ext>
     </p:extLst>
   </p:cSld>
@@ -6260,8 +6260,8 @@
           <a:lstStyle/>
           <a:p>
             <a:r>
-              <a:rPr lang="en-CA"/>
-              <a:t>$validate-code</a:t>
+              <a:rPr lang="en-US" dirty="0"/>
+              <a:t>$expand example</a:t>
             </a:r>
           </a:p>
         </p:txBody>
@@ -6282,70 +6282,69 @@
           <a:lstStyle/>
           <a:p>
             <a:r>
-              <a:rPr lang="en-CA" dirty="0"/>
-              <a:t>Takes a code/Coding/</a:t>
-            </a:r>
-            <a:r>
-              <a:rPr lang="en-CA" dirty="0" err="1"/>
-              <a:t>CodeableConcept</a:t>
-            </a:r>
-            <a:r>
-              <a:rPr lang="en-CA" dirty="0"/>
-              <a:t> and checks if it’s valid against a value set or a code system</a:t>
+              <a:rPr lang="en-US" dirty="0"/>
+              <a:t>Subtypes of “Hypertensive disorder, systemic arterial” (38341003)</a:t>
             </a:r>
           </a:p>
           <a:p>
             <a:pPr lvl="1"/>
             <a:r>
-              <a:rPr lang="en-CA" dirty="0"/>
-              <a:t>Specify value set (same as for $expand)</a:t>
-            </a:r>
+              <a:rPr lang="en-US" dirty="0"/>
+              <a:t>SNOMED CT browser </a:t>
+            </a:r>
+            <a:r>
+              <a:rPr lang="en-US" dirty="0">
+                <a:hlinkClick r:id="rId2"/>
+              </a:rPr>
+              <a:t>view</a:t>
+            </a:r>
+            <a:endParaRPr lang="en-US" dirty="0"/>
           </a:p>
           <a:p>
             <a:pPr lvl="1"/>
             <a:r>
-              <a:rPr lang="en-CA" dirty="0"/>
-              <a:t>Code to validate – either </a:t>
-            </a:r>
-            <a:r>
-              <a:rPr lang="en-CA" dirty="0" err="1"/>
-              <a:t>code+system</a:t>
-            </a:r>
-            <a:r>
-              <a:rPr lang="en-CA" dirty="0"/>
-              <a:t> (with or without version, display), Coding or </a:t>
-            </a:r>
-            <a:r>
-              <a:rPr lang="en-CA" dirty="0" err="1"/>
-              <a:t>CodeableConcept</a:t>
-            </a:r>
-            <a:endParaRPr lang="en-CA" dirty="0"/>
+              <a:rPr lang="en-US" dirty="0"/>
+              <a:t>Value set definition (</a:t>
+            </a:r>
+            <a:r>
+              <a:rPr lang="en-US" dirty="0" err="1"/>
+              <a:t>intensional</a:t>
+            </a:r>
+            <a:r>
+              <a:rPr lang="en-US" dirty="0"/>
+              <a:t>): </a:t>
+            </a:r>
+            <a:r>
+              <a:rPr lang="en-US" dirty="0">
+                <a:hlinkClick r:id="rId3"/>
+              </a:rPr>
+              <a:t>https://ontoserver.csiro.au/stu3-latest/ValueSet?url=http://www.healthintersections.com.au/fhir/ValueSet/intensional-case-2</a:t>
+            </a:r>
+            <a:endParaRPr lang="en-US" dirty="0"/>
           </a:p>
           <a:p>
             <a:pPr lvl="1"/>
             <a:r>
-              <a:rPr lang="en-CA" dirty="0"/>
-              <a:t>date – date to validate as of</a:t>
-            </a:r>
-          </a:p>
-          <a:p>
-            <a:r>
-              <a:rPr lang="en-CA" dirty="0"/>
-              <a:t>Outputs: true/false</a:t>
-            </a:r>
+              <a:rPr lang="en-US" dirty="0"/>
+              <a:t>Value set expansion: </a:t>
+            </a:r>
+            <a:r>
+              <a:rPr lang="en-US" dirty="0">
+                <a:hlinkClick r:id="rId3"/>
+              </a:rPr>
+              <a:t>https://ontoserver.csiro.au/stu3-latest/ValueSet </a:t>
+            </a:r>
+            <a:r>
+              <a:rPr lang="en-US" dirty="0">
+                <a:hlinkClick r:id="rId4"/>
+              </a:rPr>
+              <a:t>/intensional-case-2/$expand</a:t>
+            </a:r>
+            <a:endParaRPr lang="en-US" dirty="0"/>
           </a:p>
           <a:p>
             <a:pPr lvl="1"/>
-            <a:r>
-              <a:rPr lang="en-CA" dirty="0"/>
-              <a:t>message if not valid, display name (optional) if valid</a:t>
-            </a:r>
-          </a:p>
-          <a:p>
-            <a:r>
-              <a:rPr lang="en-GB" dirty="0"/>
-              <a:t>The primary method for validating coded data</a:t>
-            </a:r>
+            <a:endParaRPr lang="en-US" dirty="0"/>
           </a:p>
         </p:txBody>
       </p:sp>
@@ -6376,7 +6375,7 @@
     </p:spTree>
     <p:extLst>
       <p:ext uri="{BB962C8B-B14F-4D97-AF65-F5344CB8AC3E}">
-        <p14:creationId xmlns:p14="http://schemas.microsoft.com/office/powerpoint/2010/main" val="406380067"/>
+        <p14:creationId xmlns:p14="http://schemas.microsoft.com/office/powerpoint/2010/main" val="2500429887"/>
       </p:ext>
     </p:extLst>
   </p:cSld>
@@ -6419,8 +6418,8 @@
           <a:lstStyle/>
           <a:p>
             <a:r>
-              <a:rPr lang="en-US"/>
-              <a:t>$validate-code example</a:t>
+              <a:rPr lang="en-CA"/>
+              <a:t>$validate-code</a:t>
             </a:r>
           </a:p>
         </p:txBody>
@@ -6441,35 +6440,70 @@
           <a:lstStyle/>
           <a:p>
             <a:r>
-              <a:rPr lang="en-US" dirty="0"/>
-              <a:t>FHIR condition-category “problem-list-item”</a:t>
+              <a:rPr lang="en-CA" dirty="0"/>
+              <a:t>Takes a code/Coding/</a:t>
+            </a:r>
+            <a:r>
+              <a:rPr lang="en-CA" dirty="0" err="1"/>
+              <a:t>CodeableConcept</a:t>
+            </a:r>
+            <a:r>
+              <a:rPr lang="en-CA" dirty="0"/>
+              <a:t> and checks if it’s valid against a value set or a code system</a:t>
             </a:r>
           </a:p>
           <a:p>
             <a:pPr lvl="1"/>
             <a:r>
-              <a:rPr lang="en-US" dirty="0">
-                <a:hlinkClick r:id="rId3"/>
-              </a:rPr>
-              <a:t>http://fhirtest.uhn.ca/baseDstu3/ValueSet/$validate-code?url=http://hl7.org/fhir/ValueSet/condition-category&amp;system=http://hl7.org/fhir/condition-category&amp;code=problem-list-item</a:t>
-            </a:r>
-            <a:endParaRPr lang="en-US" dirty="0"/>
-          </a:p>
-          <a:p>
-            <a:r>
-              <a:rPr lang="is-IS" dirty="0"/>
-              <a:t>SNOMED CT “Pneumonia” (233604007)</a:t>
+              <a:rPr lang="en-CA" dirty="0"/>
+              <a:t>Specify value set (same as for $expand)</a:t>
             </a:r>
           </a:p>
           <a:p>
             <a:pPr lvl="1"/>
             <a:r>
-              <a:rPr lang="en-US" dirty="0">
-                <a:hlinkClick r:id="rId4"/>
-              </a:rPr>
-              <a:t>http://its.patientsfirst.org.nz/RestService.svc/Terminz/CodeSystem/$validate-code?system=http://snomed.info/sct&amp;code=233604007</a:t>
-            </a:r>
-            <a:endParaRPr lang="en-US" dirty="0"/>
+              <a:rPr lang="en-CA" dirty="0"/>
+              <a:t>Code to validate – either </a:t>
+            </a:r>
+            <a:r>
+              <a:rPr lang="en-CA" dirty="0" err="1"/>
+              <a:t>code+system</a:t>
+            </a:r>
+            <a:r>
+              <a:rPr lang="en-CA" dirty="0"/>
+              <a:t> (with or without version, display), Coding or </a:t>
+            </a:r>
+            <a:r>
+              <a:rPr lang="en-CA" dirty="0" err="1"/>
+              <a:t>CodeableConcept</a:t>
+            </a:r>
+            <a:endParaRPr lang="en-CA" dirty="0"/>
+          </a:p>
+          <a:p>
+            <a:pPr lvl="1"/>
+            <a:r>
+              <a:rPr lang="en-CA" dirty="0"/>
+              <a:t>date – date to validate as of</a:t>
+            </a:r>
+          </a:p>
+          <a:p>
+            <a:r>
+              <a:rPr lang="en-CA" dirty="0"/>
+              <a:t>Outputs: true/false</a:t>
+            </a:r>
+          </a:p>
+          <a:p>
+            <a:pPr lvl="1"/>
+            <a:r>
+              <a:rPr lang="en-CA" dirty="0"/>
+              <a:t>message if not valid, display name (optional) if valid</a:t>
+            </a:r>
+          </a:p>
+          <a:p>
+            <a:r>
+              <a:rPr lang="en-GB" dirty="0"/>
+              <a:t>The primary method for validating coded data</a:t>
+            </a:r>
           </a:p>
         </p:txBody>
       </p:sp>
@@ -6500,7 +6534,7 @@
     </p:spTree>
     <p:extLst>
       <p:ext uri="{BB962C8B-B14F-4D97-AF65-F5344CB8AC3E}">
-        <p14:creationId xmlns:p14="http://schemas.microsoft.com/office/powerpoint/2010/main" val="1612691181"/>
+        <p14:creationId xmlns:p14="http://schemas.microsoft.com/office/powerpoint/2010/main" val="406380067"/>
       </p:ext>
     </p:extLst>
   </p:cSld>
@@ -6543,8 +6577,8 @@
           <a:lstStyle/>
           <a:p>
             <a:r>
-              <a:rPr lang="en-CA"/>
-              <a:t>$lookup</a:t>
+              <a:rPr lang="en-US"/>
+              <a:t>$validate-code example</a:t>
             </a:r>
           </a:p>
         </p:txBody>
@@ -6565,59 +6599,35 @@
           <a:lstStyle/>
           <a:p>
             <a:r>
-              <a:rPr lang="en-CA" dirty="0"/>
-              <a:t>Takes a </a:t>
-            </a:r>
-            <a:r>
-              <a:rPr lang="en-CA" dirty="0" err="1"/>
-              <a:t>code+system</a:t>
-            </a:r>
-            <a:r>
-              <a:rPr lang="en-CA" dirty="0"/>
-              <a:t>(version) or Coding and returns additional details about the concept</a:t>
+              <a:rPr lang="en-US" dirty="0"/>
+              <a:t>FHIR condition-category “problem-list-item”</a:t>
             </a:r>
           </a:p>
           <a:p>
             <a:pPr lvl="1"/>
             <a:r>
-              <a:rPr lang="en-CA" dirty="0"/>
-              <a:t>Name, version, preferred display string, properties and designations</a:t>
-            </a:r>
-          </a:p>
-          <a:p>
-            <a:pPr lvl="2"/>
-            <a:r>
-              <a:rPr lang="en-CA" dirty="0"/>
-              <a:t>Designations are additional representations for the concept</a:t>
-            </a:r>
-          </a:p>
-          <a:p>
-            <a:r>
-              <a:rPr lang="en-CA" dirty="0"/>
-              <a:t>Some additional parameters include:</a:t>
+              <a:rPr lang="en-US" dirty="0">
+                <a:hlinkClick r:id="rId3"/>
+              </a:rPr>
+              <a:t>http://fhirtest.uhn.ca/baseDstu3/ValueSet/$validate-code?url=http://hl7.org/fhir/ValueSet/condition-category&amp;system=http://hl7.org/fhir/condition-category&amp;code=problem-list-item</a:t>
+            </a:r>
+            <a:endParaRPr lang="en-US" dirty="0"/>
+          </a:p>
+          <a:p>
+            <a:r>
+              <a:rPr lang="is-IS" dirty="0"/>
+              <a:t>SNOMED CT “Pneumonia” (233604007)</a:t>
             </a:r>
           </a:p>
           <a:p>
             <a:pPr lvl="1"/>
             <a:r>
-              <a:rPr lang="en-CA" b="1" dirty="0"/>
-              <a:t>property</a:t>
-            </a:r>
-            <a:r>
-              <a:rPr lang="en-CA" dirty="0"/>
-              <a:t>: Only include concepts with display name containing string</a:t>
-            </a:r>
-          </a:p>
-          <a:p>
-            <a:pPr lvl="1"/>
-            <a:r>
-              <a:rPr lang="en-CA" b="1" dirty="0"/>
-              <a:t>date</a:t>
-            </a:r>
-            <a:r>
-              <a:rPr lang="en-CA" dirty="0"/>
-              <a:t>: return information as of the specified date</a:t>
-            </a:r>
+              <a:rPr lang="en-US" dirty="0">
+                <a:hlinkClick r:id="rId4"/>
+              </a:rPr>
+              <a:t>http://its.patientsfirst.org.nz/RestService.svc/Terminz/CodeSystem/$validate-code?system=http://snomed.info/sct&amp;code=233604007</a:t>
+            </a:r>
+            <a:endParaRPr lang="en-US" dirty="0"/>
           </a:p>
         </p:txBody>
       </p:sp>
@@ -6648,7 +6658,7 @@
     </p:spTree>
     <p:extLst>
       <p:ext uri="{BB962C8B-B14F-4D97-AF65-F5344CB8AC3E}">
-        <p14:creationId xmlns:p14="http://schemas.microsoft.com/office/powerpoint/2010/main" val="734792980"/>
+        <p14:creationId xmlns:p14="http://schemas.microsoft.com/office/powerpoint/2010/main" val="1612691181"/>
       </p:ext>
     </p:extLst>
   </p:cSld>
@@ -6713,54 +6723,59 @@
           <a:lstStyle/>
           <a:p>
             <a:r>
-              <a:rPr lang="en-GB" dirty="0"/>
-              <a:t>$lookup can also be used to determine whether a code exists in the </a:t>
-            </a:r>
-            <a:r>
-              <a:rPr lang="en-GB" dirty="0" err="1"/>
-              <a:t>CodeSystem</a:t>
-            </a:r>
-            <a:endParaRPr lang="en-GB" dirty="0"/>
+              <a:rPr lang="en-CA" dirty="0"/>
+              <a:t>Takes a </a:t>
+            </a:r>
+            <a:r>
+              <a:rPr lang="en-CA" dirty="0" err="1"/>
+              <a:t>code+system</a:t>
+            </a:r>
+            <a:r>
+              <a:rPr lang="en-CA" dirty="0"/>
+              <a:t>(version) or Coding and returns additional details about the concept</a:t>
+            </a:r>
           </a:p>
           <a:p>
             <a:pPr lvl="1"/>
             <a:r>
-              <a:rPr lang="en-GB" dirty="0"/>
-              <a:t>Provides similar capability to using $validate-code with </a:t>
-            </a:r>
-            <a:r>
-              <a:rPr lang="en-GB" dirty="0" err="1"/>
-              <a:t>CodeSystem</a:t>
-            </a:r>
-            <a:r>
-              <a:rPr lang="en-GB" dirty="0"/>
-              <a:t>, but returns an </a:t>
-            </a:r>
-            <a:r>
-              <a:rPr lang="en-GB" dirty="0" err="1"/>
-              <a:t>OperationOutcome</a:t>
-            </a:r>
-            <a:r>
-              <a:rPr lang="en-GB" dirty="0"/>
-              <a:t> (error) if the code does not exist</a:t>
+              <a:rPr lang="en-CA" dirty="0"/>
+              <a:t>Name, version, preferred display string, properties and designations</a:t>
+            </a:r>
+          </a:p>
+          <a:p>
+            <a:pPr lvl="2"/>
+            <a:r>
+              <a:rPr lang="en-CA" dirty="0"/>
+              <a:t>Designations are additional representations for the concept</a:t>
+            </a:r>
+          </a:p>
+          <a:p>
+            <a:r>
+              <a:rPr lang="en-CA" dirty="0"/>
+              <a:t>Some additional parameters include:</a:t>
             </a:r>
           </a:p>
           <a:p>
             <a:pPr lvl="1"/>
             <a:r>
-              <a:rPr lang="en-GB" dirty="0"/>
-              <a:t>Returns the details if the lookup is successful</a:t>
-            </a:r>
-          </a:p>
-          <a:p>
-            <a:pPr lvl="2"/>
-            <a:r>
-              <a:rPr lang="en-GB" dirty="0"/>
-              <a:t>Only needs one operation, rather than two</a:t>
-            </a:r>
-          </a:p>
-          <a:p>
-            <a:endParaRPr lang="en-CA" dirty="0"/>
+              <a:rPr lang="en-CA" b="1" dirty="0"/>
+              <a:t>property</a:t>
+            </a:r>
+            <a:r>
+              <a:rPr lang="en-CA" dirty="0"/>
+              <a:t>: Only include concepts with display name containing string</a:t>
+            </a:r>
+          </a:p>
+          <a:p>
+            <a:pPr lvl="1"/>
+            <a:r>
+              <a:rPr lang="en-CA" b="1" dirty="0"/>
+              <a:t>date</a:t>
+            </a:r>
+            <a:r>
+              <a:rPr lang="en-CA" dirty="0"/>
+              <a:t>: return information as of the specified date</a:t>
+            </a:r>
           </a:p>
         </p:txBody>
       </p:sp>
@@ -6791,7 +6806,7 @@
     </p:spTree>
     <p:extLst>
       <p:ext uri="{BB962C8B-B14F-4D97-AF65-F5344CB8AC3E}">
-        <p14:creationId xmlns:p14="http://schemas.microsoft.com/office/powerpoint/2010/main" val="3437077618"/>
+        <p14:creationId xmlns:p14="http://schemas.microsoft.com/office/powerpoint/2010/main" val="734792980"/>
       </p:ext>
     </p:extLst>
   </p:cSld>
@@ -7032,8 +7047,8 @@
           <a:lstStyle/>
           <a:p>
             <a:r>
-              <a:rPr lang="en-US"/>
-              <a:t>$lookup example</a:t>
+              <a:rPr lang="en-CA"/>
+              <a:t>$lookup</a:t>
             </a:r>
           </a:p>
         </p:txBody>
@@ -7054,58 +7069,54 @@
           <a:lstStyle/>
           <a:p>
             <a:r>
-              <a:rPr lang="is-IS" dirty="0"/>
-              <a:t>SNOMED CT </a:t>
-            </a:r>
-            <a:r>
-              <a:rPr lang="en-US" dirty="0"/>
-              <a:t>“Pneumonia” (</a:t>
-            </a:r>
-            <a:r>
-              <a:rPr lang="is-IS" dirty="0"/>
-              <a:t>233604007</a:t>
-            </a:r>
-            <a:r>
-              <a:rPr lang="en-US" dirty="0"/>
-              <a:t>)</a:t>
-            </a:r>
+              <a:rPr lang="en-GB" dirty="0"/>
+              <a:t>$lookup can also be used to determine whether a code exists in the </a:t>
+            </a:r>
+            <a:r>
+              <a:rPr lang="en-GB" dirty="0" err="1"/>
+              <a:t>CodeSystem</a:t>
+            </a:r>
+            <a:endParaRPr lang="en-GB" dirty="0"/>
           </a:p>
           <a:p>
             <a:pPr lvl="1"/>
             <a:r>
-              <a:rPr lang="en-US" dirty="0">
-                <a:hlinkClick r:id="rId2"/>
-              </a:rPr>
-              <a:t>https://ontoserver.csiro.au/stu3-latest/CodeSystem/$lookup?system=http://snomed.info/sct&amp;code=233604007</a:t>
-            </a:r>
-            <a:endParaRPr lang="en-US" dirty="0"/>
+              <a:rPr lang="en-GB" dirty="0"/>
+              <a:t>Provides similar capability to using $validate-code with </a:t>
+            </a:r>
+            <a:r>
+              <a:rPr lang="en-GB" dirty="0" err="1"/>
+              <a:t>CodeSystem</a:t>
+            </a:r>
+            <a:r>
+              <a:rPr lang="en-GB" dirty="0"/>
+              <a:t>, but returns an </a:t>
+            </a:r>
+            <a:r>
+              <a:rPr lang="en-GB" dirty="0" err="1"/>
+              <a:t>OperationOutcome</a:t>
+            </a:r>
+            <a:r>
+              <a:rPr lang="en-GB" dirty="0"/>
+              <a:t> (error) if the code does not exist</a:t>
+            </a:r>
           </a:p>
           <a:p>
             <a:pPr lvl="1"/>
             <a:r>
-              <a:rPr lang="en-US" dirty="0">
-                <a:hlinkClick r:id="rId3"/>
-              </a:rPr>
-              <a:t>http://tx.fhir.org/r3/CodeSystem/$lookup?system=http://snomed.info/sct&amp;code=233604007</a:t>
-            </a:r>
-            <a:endParaRPr lang="en-US" dirty="0"/>
-          </a:p>
-          <a:p>
-            <a:pPr lvl="1"/>
-            <a:endParaRPr lang="en-US" dirty="0"/>
-          </a:p>
-          <a:p>
-            <a:pPr marL="457200" lvl="1" indent="0">
-              <a:buNone/>
-            </a:pPr>
-            <a:r>
-              <a:rPr lang="en-US" dirty="0"/>
-              <a:t>Note: Different servers will display different details! </a:t>
-            </a:r>
-          </a:p>
-          <a:p>
-            <a:pPr lvl="1"/>
-            <a:endParaRPr lang="en-US" dirty="0"/>
+              <a:rPr lang="en-GB" dirty="0"/>
+              <a:t>Returns the details if the lookup is successful</a:t>
+            </a:r>
+          </a:p>
+          <a:p>
+            <a:pPr lvl="2"/>
+            <a:r>
+              <a:rPr lang="en-GB" dirty="0"/>
+              <a:t>Only needs one operation, rather than two</a:t>
+            </a:r>
+          </a:p>
+          <a:p>
+            <a:endParaRPr lang="en-CA" dirty="0"/>
           </a:p>
         </p:txBody>
       </p:sp>
@@ -7136,7 +7147,7 @@
     </p:spTree>
     <p:extLst>
       <p:ext uri="{BB962C8B-B14F-4D97-AF65-F5344CB8AC3E}">
-        <p14:creationId xmlns:p14="http://schemas.microsoft.com/office/powerpoint/2010/main" val="772174046"/>
+        <p14:creationId xmlns:p14="http://schemas.microsoft.com/office/powerpoint/2010/main" val="3437077618"/>
       </p:ext>
     </p:extLst>
   </p:cSld>
@@ -7179,8 +7190,8 @@
           <a:lstStyle/>
           <a:p>
             <a:r>
-              <a:rPr lang="en-CA"/>
-              <a:t>$subsumes</a:t>
+              <a:rPr lang="en-US"/>
+              <a:t>$lookup example</a:t>
             </a:r>
           </a:p>
         </p:txBody>
@@ -7201,73 +7212,58 @@
           <a:lstStyle/>
           <a:p>
             <a:r>
-              <a:rPr lang="en-US"/>
-              <a:t>Test whether </a:t>
-            </a:r>
-            <a:r>
-              <a:rPr lang="en-US" err="1"/>
-              <a:t>codeA</a:t>
-            </a:r>
-            <a:r>
-              <a:rPr lang="en-US"/>
-              <a:t> / </a:t>
-            </a:r>
-            <a:r>
-              <a:rPr lang="en-US" err="1"/>
-              <a:t>codingA</a:t>
-            </a:r>
-            <a:r>
-              <a:rPr lang="en-US"/>
-              <a:t> subsumes (or is subsumed by) </a:t>
-            </a:r>
-            <a:r>
-              <a:rPr lang="en-US" err="1"/>
-              <a:t>codeB</a:t>
-            </a:r>
-            <a:r>
-              <a:rPr lang="en-US"/>
-              <a:t> / </a:t>
-            </a:r>
-            <a:r>
-              <a:rPr lang="en-US" err="1"/>
-              <a:t>codingB</a:t>
-            </a:r>
-            <a:endParaRPr lang="en-US"/>
+              <a:rPr lang="is-IS" dirty="0"/>
+              <a:t>SNOMED CT </a:t>
+            </a:r>
+            <a:r>
+              <a:rPr lang="en-US" dirty="0"/>
+              <a:t>“Pneumonia” (</a:t>
+            </a:r>
+            <a:r>
+              <a:rPr lang="is-IS" dirty="0"/>
+              <a:t>233604007</a:t>
+            </a:r>
+            <a:r>
+              <a:rPr lang="en-US" dirty="0"/>
+              <a:t>)</a:t>
+            </a:r>
           </a:p>
           <a:p>
             <a:pPr lvl="1"/>
             <a:r>
-              <a:rPr lang="en-US"/>
-              <a:t>Based on the semantics of </a:t>
-            </a:r>
-            <a:r>
-              <a:rPr lang="en-US" err="1"/>
-              <a:t>subsumption</a:t>
-            </a:r>
-            <a:r>
-              <a:rPr lang="en-US"/>
-              <a:t> in the underlying code system (e.g. SNOMED CT)</a:t>
-            </a:r>
-            <a:endParaRPr lang="en-CA"/>
-          </a:p>
-          <a:p>
-            <a:r>
-              <a:rPr lang="en-CA"/>
-              <a:t>Returns one of four possible codes:</a:t>
-            </a:r>
+              <a:rPr lang="en-US" dirty="0">
+                <a:hlinkClick r:id="rId2"/>
+              </a:rPr>
+              <a:t>https://ontoserver.csiro.au/stu3-latest/CodeSystem/$lookup?system=http://snomed.info/sct&amp;code=233604007</a:t>
+            </a:r>
+            <a:endParaRPr lang="en-US" dirty="0"/>
           </a:p>
           <a:p>
             <a:pPr lvl="1"/>
             <a:r>
-              <a:rPr lang="en-CA"/>
-              <a:t>equivalent, subsumes, subsumed-by, and not-subsumed</a:t>
-            </a:r>
-          </a:p>
-          <a:p>
-            <a:r>
-              <a:rPr lang="en-CA"/>
-              <a:t>If unable to determine the relationship between codes, returns an error</a:t>
-            </a:r>
+              <a:rPr lang="en-US" dirty="0">
+                <a:hlinkClick r:id="rId3"/>
+              </a:rPr>
+              <a:t>http://tx.fhir.org/r3/CodeSystem/$lookup?system=http://snomed.info/sct&amp;code=233604007</a:t>
+            </a:r>
+            <a:endParaRPr lang="en-US" dirty="0"/>
+          </a:p>
+          <a:p>
+            <a:pPr lvl="1"/>
+            <a:endParaRPr lang="en-US" dirty="0"/>
+          </a:p>
+          <a:p>
+            <a:pPr marL="457200" lvl="1" indent="0">
+              <a:buNone/>
+            </a:pPr>
+            <a:r>
+              <a:rPr lang="en-US" dirty="0"/>
+              <a:t>Note: Different servers will display different details! </a:t>
+            </a:r>
+          </a:p>
+          <a:p>
+            <a:pPr lvl="1"/>
+            <a:endParaRPr lang="en-US" dirty="0"/>
           </a:p>
         </p:txBody>
       </p:sp>
@@ -7298,7 +7294,7 @@
     </p:spTree>
     <p:extLst>
       <p:ext uri="{BB962C8B-B14F-4D97-AF65-F5344CB8AC3E}">
-        <p14:creationId xmlns:p14="http://schemas.microsoft.com/office/powerpoint/2010/main" val="1561001184"/>
+        <p14:creationId xmlns:p14="http://schemas.microsoft.com/office/powerpoint/2010/main" val="772174046"/>
       </p:ext>
     </p:extLst>
   </p:cSld>
@@ -7341,78 +7337,95 @@
           <a:lstStyle/>
           <a:p>
             <a:r>
+              <a:rPr lang="en-CA"/>
+              <a:t>$subsumes</a:t>
+            </a:r>
+          </a:p>
+        </p:txBody>
+      </p:sp>
+      <p:sp>
+        <p:nvSpPr>
+          <p:cNvPr id="3" name="Content Placeholder 2"/>
+          <p:cNvSpPr>
+            <a:spLocks noGrp="1"/>
+          </p:cNvSpPr>
+          <p:nvPr>
+            <p:ph idx="1"/>
+          </p:nvPr>
+        </p:nvSpPr>
+        <p:spPr/>
+        <p:txBody>
+          <a:bodyPr/>
+          <a:lstStyle/>
+          <a:p>
+            <a:r>
               <a:rPr lang="en-US"/>
-              <a:t>$subsumes example</a:t>
-            </a:r>
-          </a:p>
-        </p:txBody>
-      </p:sp>
-      <p:sp>
-        <p:nvSpPr>
-          <p:cNvPr id="3" name="Content Placeholder 2"/>
-          <p:cNvSpPr>
-            <a:spLocks noGrp="1"/>
-          </p:cNvSpPr>
-          <p:nvPr>
-            <p:ph idx="1"/>
-          </p:nvPr>
-        </p:nvSpPr>
-        <p:spPr/>
-        <p:txBody>
-          <a:bodyPr/>
-          <a:lstStyle/>
-          <a:p>
-            <a:r>
-              <a:rPr lang="is-IS" dirty="0"/>
-              <a:t>SNOMED CT </a:t>
-            </a:r>
-            <a:r>
-              <a:rPr lang="en-US" dirty="0"/>
-              <a:t>“Viral hepatitis” (</a:t>
-            </a:r>
-            <a:r>
-              <a:rPr lang="is-IS" dirty="0"/>
-              <a:t>3738000</a:t>
-            </a:r>
-            <a:r>
-              <a:rPr lang="en-US" dirty="0"/>
-              <a:t>), “Disorder of liver” (</a:t>
-            </a:r>
-            <a:r>
-              <a:rPr lang="is-IS" dirty="0"/>
-              <a:t>235856003</a:t>
-            </a:r>
-            <a:r>
-              <a:rPr lang="en-US" dirty="0"/>
-              <a:t>)</a:t>
-            </a:r>
-          </a:p>
-          <a:p>
-            <a:r>
-              <a:rPr lang="is-IS" dirty="0"/>
-              <a:t>Is code A subsumed by code B?</a:t>
-            </a:r>
-            <a:endParaRPr lang="en-US" dirty="0"/>
+              <a:t>Test whether </a:t>
+            </a:r>
+            <a:r>
+              <a:rPr lang="en-US" err="1"/>
+              <a:t>codeA</a:t>
+            </a:r>
+            <a:r>
+              <a:rPr lang="en-US"/>
+              <a:t> / </a:t>
+            </a:r>
+            <a:r>
+              <a:rPr lang="en-US" err="1"/>
+              <a:t>codingA</a:t>
+            </a:r>
+            <a:r>
+              <a:rPr lang="en-US"/>
+              <a:t> subsumes (or is subsumed by) </a:t>
+            </a:r>
+            <a:r>
+              <a:rPr lang="en-US" err="1"/>
+              <a:t>codeB</a:t>
+            </a:r>
+            <a:r>
+              <a:rPr lang="en-US"/>
+              <a:t> / </a:t>
+            </a:r>
+            <a:r>
+              <a:rPr lang="en-US" err="1"/>
+              <a:t>codingB</a:t>
+            </a:r>
+            <a:endParaRPr lang="en-US"/>
           </a:p>
           <a:p>
             <a:pPr lvl="1"/>
             <a:r>
-              <a:rPr lang="en-GB" dirty="0">
-                <a:hlinkClick r:id="rId2"/>
-              </a:rPr>
-              <a:t>http://tx.fhir.org/r3/CodeSystem/$subsumes?system=http://snomed.info/sct&amp;codeA=3738000&amp;codeB=235856003</a:t>
-            </a:r>
-            <a:endParaRPr lang="en-GB" dirty="0"/>
+              <a:rPr lang="en-US"/>
+              <a:t>Based on the semantics of </a:t>
+            </a:r>
+            <a:r>
+              <a:rPr lang="en-US" err="1"/>
+              <a:t>subsumption</a:t>
+            </a:r>
+            <a:r>
+              <a:rPr lang="en-US"/>
+              <a:t> in the underlying code system (e.g. SNOMED CT)</a:t>
+            </a:r>
+            <a:endParaRPr lang="en-CA"/>
+          </a:p>
+          <a:p>
+            <a:r>
+              <a:rPr lang="en-CA"/>
+              <a:t>Returns one of four possible codes:</a:t>
+            </a:r>
           </a:p>
           <a:p>
             <a:pPr lvl="1"/>
             <a:r>
-              <a:rPr lang="en-GB" dirty="0">
-                <a:hlinkClick r:id="rId3"/>
-              </a:rPr>
-              <a:t>http://tx.fhir.org/r3/CodeSystem/$subsumes?system=http://snomed.info/sct&amp;codeB=3738000&amp;codeA=235856003</a:t>
-            </a:r>
-            <a:endParaRPr lang="en-GB" dirty="0"/>
+              <a:rPr lang="en-CA"/>
+              <a:t>equivalent, subsumes, subsumed-by, and not-subsumed</a:t>
+            </a:r>
+          </a:p>
+          <a:p>
+            <a:r>
+              <a:rPr lang="en-CA"/>
+              <a:t>If unable to determine the relationship between codes, returns an error</a:t>
+            </a:r>
           </a:p>
         </p:txBody>
       </p:sp>
@@ -7443,7 +7456,7 @@
     </p:spTree>
     <p:extLst>
       <p:ext uri="{BB962C8B-B14F-4D97-AF65-F5344CB8AC3E}">
-        <p14:creationId xmlns:p14="http://schemas.microsoft.com/office/powerpoint/2010/main" val="1869065543"/>
+        <p14:creationId xmlns:p14="http://schemas.microsoft.com/office/powerpoint/2010/main" val="1561001184"/>
       </p:ext>
     </p:extLst>
   </p:cSld>
@@ -7486,8 +7499,8 @@
           <a:lstStyle/>
           <a:p>
             <a:r>
-              <a:rPr lang="en-CA"/>
-              <a:t>$translate</a:t>
+              <a:rPr lang="en-US"/>
+              <a:t>$subsumes example</a:t>
             </a:r>
           </a:p>
         </p:txBody>
@@ -7508,73 +7521,56 @@
           <a:lstStyle/>
           <a:p>
             <a:r>
-              <a:rPr lang="en-AU" dirty="0"/>
-              <a:t>Can you translate this code to another code system?</a:t>
-            </a:r>
-            <a:endParaRPr lang="en-CA" dirty="0"/>
-          </a:p>
-          <a:p>
-            <a:r>
-              <a:rPr lang="en-CA" dirty="0"/>
-              <a:t>Uses </a:t>
-            </a:r>
-            <a:r>
-              <a:rPr lang="en-CA" dirty="0" err="1"/>
-              <a:t>ConceptMap</a:t>
-            </a:r>
-            <a:r>
-              <a:rPr lang="en-CA" dirty="0"/>
-              <a:t> to translate the code(s)</a:t>
-            </a:r>
+              <a:rPr lang="is-IS" dirty="0"/>
+              <a:t>SNOMED CT </a:t>
+            </a:r>
+            <a:r>
+              <a:rPr lang="en-US" dirty="0"/>
+              <a:t>“Viral hepatitis” (</a:t>
+            </a:r>
+            <a:r>
+              <a:rPr lang="is-IS" dirty="0"/>
+              <a:t>3738000</a:t>
+            </a:r>
+            <a:r>
+              <a:rPr lang="en-US" dirty="0"/>
+              <a:t>), “Disorder of liver” (</a:t>
+            </a:r>
+            <a:r>
+              <a:rPr lang="is-IS" dirty="0"/>
+              <a:t>235856003</a:t>
+            </a:r>
+            <a:r>
+              <a:rPr lang="en-US" dirty="0"/>
+              <a:t>)</a:t>
+            </a:r>
+          </a:p>
+          <a:p>
+            <a:r>
+              <a:rPr lang="is-IS" dirty="0"/>
+              <a:t>Is code A subsumed by code B?</a:t>
+            </a:r>
+            <a:endParaRPr lang="en-US" dirty="0"/>
           </a:p>
           <a:p>
             <a:pPr lvl="1"/>
             <a:r>
-              <a:rPr lang="en-CA" dirty="0"/>
-              <a:t>http://...ConceptMap/id$translate</a:t>
-            </a:r>
+              <a:rPr lang="en-GB" dirty="0">
+                <a:hlinkClick r:id="rId2"/>
+              </a:rPr>
+              <a:t>http://tx.fhir.org/r3/CodeSystem/$subsumes?system=http://snomed.info/sct&amp;codeA=3738000&amp;codeB=235856003</a:t>
+            </a:r>
+            <a:endParaRPr lang="en-GB" dirty="0"/>
           </a:p>
           <a:p>
             <a:pPr lvl="1"/>
             <a:r>
-              <a:rPr lang="en-CA" dirty="0"/>
-              <a:t>code, Coding or </a:t>
-            </a:r>
-            <a:r>
-              <a:rPr lang="en-CA" dirty="0" err="1"/>
-              <a:t>CodeableConcept</a:t>
-            </a:r>
-            <a:r>
-              <a:rPr lang="en-CA" dirty="0"/>
-              <a:t> passed (as per $validate-code)</a:t>
-            </a:r>
-          </a:p>
-          <a:p>
-            <a:r>
-              <a:rPr lang="en-CA" dirty="0"/>
-              <a:t>Output:</a:t>
-            </a:r>
-          </a:p>
-          <a:p>
-            <a:pPr lvl="1"/>
-            <a:r>
-              <a:rPr lang="en-CA" dirty="0"/>
-              <a:t>True if can be translated</a:t>
-            </a:r>
-          </a:p>
-          <a:p>
-            <a:pPr lvl="1"/>
-            <a:r>
-              <a:rPr lang="en-CA" dirty="0"/>
-              <a:t>Message if can’t be translated</a:t>
-            </a:r>
-          </a:p>
-          <a:p>
-            <a:pPr lvl="1"/>
-            <a:r>
-              <a:rPr lang="en-CA" dirty="0"/>
-              <a:t>Translated coding if it can be translated</a:t>
-            </a:r>
+              <a:rPr lang="en-GB" dirty="0">
+                <a:hlinkClick r:id="rId3"/>
+              </a:rPr>
+              <a:t>http://tx.fhir.org/r3/CodeSystem/$subsumes?system=http://snomed.info/sct&amp;codeB=3738000&amp;codeA=235856003</a:t>
+            </a:r>
+            <a:endParaRPr lang="en-GB" dirty="0"/>
           </a:p>
         </p:txBody>
       </p:sp>
@@ -7605,7 +7601,7 @@
     </p:spTree>
     <p:extLst>
       <p:ext uri="{BB962C8B-B14F-4D97-AF65-F5344CB8AC3E}">
-        <p14:creationId xmlns:p14="http://schemas.microsoft.com/office/powerpoint/2010/main" val="747267730"/>
+        <p14:creationId xmlns:p14="http://schemas.microsoft.com/office/powerpoint/2010/main" val="1869065543"/>
       </p:ext>
     </p:extLst>
   </p:cSld>
@@ -7648,8 +7644,8 @@
           <a:lstStyle/>
           <a:p>
             <a:r>
-              <a:rPr lang="en-US"/>
-              <a:t>$translate example</a:t>
+              <a:rPr lang="en-CA"/>
+              <a:t>$translate</a:t>
             </a:r>
           </a:p>
         </p:txBody>
@@ -7670,91 +7666,73 @@
           <a:lstStyle/>
           <a:p>
             <a:r>
-              <a:rPr lang="en-US" dirty="0"/>
-              <a:t>FHIR address-use to V3 </a:t>
-            </a:r>
-            <a:r>
-              <a:rPr lang="en-US" dirty="0" err="1"/>
-              <a:t>AddressUse</a:t>
-            </a:r>
-            <a:r>
-              <a:rPr lang="en-US" dirty="0"/>
-              <a:t> value sets (</a:t>
-            </a:r>
-            <a:r>
-              <a:rPr lang="en-US" dirty="0" err="1"/>
-              <a:t>tx.fhir.org</a:t>
-            </a:r>
-            <a:r>
-              <a:rPr lang="en-US" dirty="0"/>
-              <a:t>)</a:t>
+              <a:rPr lang="en-AU" dirty="0"/>
+              <a:t>Can you translate this code to another code system?</a:t>
+            </a:r>
+            <a:endParaRPr lang="en-CA" dirty="0"/>
+          </a:p>
+          <a:p>
+            <a:r>
+              <a:rPr lang="en-CA" dirty="0"/>
+              <a:t>Uses </a:t>
+            </a:r>
+            <a:r>
+              <a:rPr lang="en-CA" dirty="0" err="1"/>
+              <a:t>ConceptMap</a:t>
+            </a:r>
+            <a:r>
+              <a:rPr lang="en-CA" dirty="0"/>
+              <a:t> to translate the code(s)</a:t>
             </a:r>
           </a:p>
           <a:p>
             <a:pPr lvl="1"/>
             <a:r>
-              <a:rPr lang="en-US" dirty="0"/>
-              <a:t>What is the code in the “v2 Address Type” (table 0190) value set (the target) that corresponds to the code ‘home’ in the FHIR “</a:t>
-            </a:r>
-            <a:r>
-              <a:rPr lang="en-US" dirty="0" err="1"/>
-              <a:t>AddressUse</a:t>
-            </a:r>
-            <a:r>
-              <a:rPr lang="en-US" dirty="0"/>
-              <a:t>” value set (the source)?</a:t>
-            </a:r>
-            <a:endParaRPr lang="en-US" dirty="0">
-              <a:hlinkClick r:id="rId2">
-                <a:extLst>
-                  <a:ext uri="{A12FA001-AC4F-418D-AE19-62706E023703}">
-                    <ahyp:hlinkClr xmlns:ahyp="http://schemas.microsoft.com/office/drawing/2018/hyperlinkcolor" val="tx"/>
-                  </a:ext>
-                </a:extLst>
-              </a:hlinkClick>
-            </a:endParaRPr>
+              <a:rPr lang="en-CA" dirty="0"/>
+              <a:t>http://...ConceptMap/id$translate</a:t>
+            </a:r>
           </a:p>
           <a:p>
             <a:pPr lvl="1"/>
             <a:r>
-              <a:rPr lang="en-US" dirty="0">
-                <a:hlinkClick r:id="rId3"/>
-              </a:rPr>
-              <a:t>http://tx.fhir.org/r3/ConceptMap/cm-address-use-v2/$translate?system=http://hl7.org/fhir/address-use&amp;code=home&amp;source=http://hl7.org/fhir/ValueSet/address-use&amp;target=http://hl7.org/fhir/ValueSet/v2-0190</a:t>
-            </a:r>
-            <a:endParaRPr lang="en-US" dirty="0"/>
+              <a:rPr lang="en-CA" dirty="0"/>
+              <a:t>code, Coding or </a:t>
+            </a:r>
+            <a:r>
+              <a:rPr lang="en-CA" dirty="0" err="1"/>
+              <a:t>CodeableConcept</a:t>
+            </a:r>
+            <a:r>
+              <a:rPr lang="en-CA" dirty="0"/>
+              <a:t> passed (as per $validate-code)</a:t>
+            </a:r>
+          </a:p>
+          <a:p>
+            <a:r>
+              <a:rPr lang="en-CA" dirty="0"/>
+              <a:t>Output:</a:t>
+            </a:r>
           </a:p>
           <a:p>
             <a:pPr lvl="1"/>
             <a:r>
-              <a:rPr lang="en-US" dirty="0" err="1"/>
-              <a:t>ConceptMap</a:t>
-            </a:r>
-            <a:r>
-              <a:rPr lang="en-US" dirty="0"/>
-              <a:t> resource used in the example:</a:t>
-            </a:r>
-            <a:br>
-              <a:rPr lang="en-US" dirty="0"/>
-            </a:br>
-            <a:r>
-              <a:rPr lang="en-US" dirty="0">
-                <a:hlinkClick r:id="rId4"/>
-              </a:rPr>
-              <a:t>http://tx.fhir.org/r3/ConceptMap/cm-address-use-v2</a:t>
-            </a:r>
-            <a:endParaRPr lang="en-US" dirty="0">
-              <a:hlinkClick r:id="rId5"/>
-            </a:endParaRPr>
+              <a:rPr lang="en-CA" dirty="0"/>
+              <a:t>True if can be translated</a:t>
+            </a:r>
           </a:p>
           <a:p>
             <a:pPr lvl="1"/>
-            <a:endParaRPr lang="en-US" dirty="0">
-              <a:hlinkClick r:id="rId2"/>
-            </a:endParaRPr>
-          </a:p>
-          <a:p>
-            <a:endParaRPr lang="en-US" dirty="0"/>
+            <a:r>
+              <a:rPr lang="en-CA" dirty="0"/>
+              <a:t>Message if can’t be translated</a:t>
+            </a:r>
+          </a:p>
+          <a:p>
+            <a:pPr lvl="1"/>
+            <a:r>
+              <a:rPr lang="en-CA" dirty="0"/>
+              <a:t>Translated coding if it can be translated</a:t>
+            </a:r>
           </a:p>
         </p:txBody>
       </p:sp>
@@ -7785,7 +7763,7 @@
     </p:spTree>
     <p:extLst>
       <p:ext uri="{BB962C8B-B14F-4D97-AF65-F5344CB8AC3E}">
-        <p14:creationId xmlns:p14="http://schemas.microsoft.com/office/powerpoint/2010/main" val="1667272130"/>
+        <p14:creationId xmlns:p14="http://schemas.microsoft.com/office/powerpoint/2010/main" val="747267730"/>
       </p:ext>
     </p:extLst>
   </p:cSld>
@@ -7814,13 +7792,7 @@
       </p:grpSpPr>
       <p:sp>
         <p:nvSpPr>
-          <p:cNvPr id="2" name="Title 1">
-            <a:extLst>
-              <a:ext uri="{FF2B5EF4-FFF2-40B4-BE49-F238E27FC236}">
-                <a16:creationId xmlns:a16="http://schemas.microsoft.com/office/drawing/2014/main" id="{4212A2B2-4F5C-D04C-B5CE-8199AC5B3139}"/>
-              </a:ext>
-            </a:extLst>
-          </p:cNvPr>
+          <p:cNvPr id="2" name="Title 1"/>
           <p:cNvSpPr>
             <a:spLocks noGrp="1"/>
           </p:cNvSpPr>
@@ -7835,20 +7807,14 @@
           <a:p>
             <a:r>
               <a:rPr lang="en-US"/>
-              <a:t>Some Useful Ideas</a:t>
-            </a:r>
-          </a:p>
-        </p:txBody>
-      </p:sp>
-      <p:sp>
-        <p:nvSpPr>
-          <p:cNvPr id="3" name="Content Placeholder 2">
-            <a:extLst>
-              <a:ext uri="{FF2B5EF4-FFF2-40B4-BE49-F238E27FC236}">
-                <a16:creationId xmlns:a16="http://schemas.microsoft.com/office/drawing/2014/main" id="{6E2A823B-9416-8E44-A89D-BF39C8C5C3EC}"/>
-              </a:ext>
-            </a:extLst>
-          </p:cNvPr>
+              <a:t>$translate example</a:t>
+            </a:r>
+          </a:p>
+        </p:txBody>
+      </p:sp>
+      <p:sp>
+        <p:nvSpPr>
+          <p:cNvPr id="3" name="Content Placeholder 2"/>
           <p:cNvSpPr>
             <a:spLocks noGrp="1"/>
           </p:cNvSpPr>
@@ -7862,104 +7828,97 @@
           <a:lstStyle/>
           <a:p>
             <a:r>
-              <a:rPr lang="en-GB"/>
-              <a:t>Paging</a:t>
+              <a:rPr lang="en-US" dirty="0"/>
+              <a:t>FHIR address-use to V3 </a:t>
+            </a:r>
+            <a:r>
+              <a:rPr lang="en-US" dirty="0" err="1"/>
+              <a:t>AddressUse</a:t>
+            </a:r>
+            <a:r>
+              <a:rPr lang="en-US" dirty="0"/>
+              <a:t> value sets (</a:t>
+            </a:r>
+            <a:r>
+              <a:rPr lang="en-US" dirty="0" err="1"/>
+              <a:t>tx.fhir.org</a:t>
+            </a:r>
+            <a:r>
+              <a:rPr lang="en-US" dirty="0"/>
+              <a:t>)</a:t>
             </a:r>
           </a:p>
           <a:p>
             <a:pPr lvl="1"/>
             <a:r>
-              <a:rPr lang="en-GB"/>
-              <a:t>Search results can be paged</a:t>
-            </a:r>
-          </a:p>
-          <a:p>
-            <a:pPr lvl="2"/>
-            <a:r>
-              <a:rPr lang="en-GB"/>
-              <a:t>http://hl7.org/</a:t>
-            </a:r>
-            <a:r>
-              <a:rPr lang="en-GB" err="1"/>
-              <a:t>fhir</a:t>
-            </a:r>
-            <a:r>
-              <a:rPr lang="en-GB"/>
-              <a:t>/</a:t>
-            </a:r>
-            <a:r>
-              <a:rPr lang="en-GB" err="1"/>
-              <a:t>search.html</a:t>
-            </a:r>
-            <a:r>
-              <a:rPr lang="en-GB"/>
-              <a:t>, see the _count parameter</a:t>
-            </a:r>
+              <a:rPr lang="en-US" dirty="0"/>
+              <a:t>What is the code in the “v2 Address Type” (table 0190) value set (the target) that corresponds to the code ‘home’ in the FHIR “</a:t>
+            </a:r>
+            <a:r>
+              <a:rPr lang="en-US" dirty="0" err="1"/>
+              <a:t>AddressUse</a:t>
+            </a:r>
+            <a:r>
+              <a:rPr lang="en-US" dirty="0"/>
+              <a:t>” value set (the source)?</a:t>
+            </a:r>
+            <a:endParaRPr lang="en-US" dirty="0">
+              <a:hlinkClick r:id="rId2">
+                <a:extLst>
+                  <a:ext uri="{A12FA001-AC4F-418D-AE19-62706E023703}">
+                    <ahyp:hlinkClr xmlns:ahyp="http://schemas.microsoft.com/office/drawing/2018/hyperlinkcolor" val="tx"/>
+                  </a:ext>
+                </a:extLst>
+              </a:hlinkClick>
+            </a:endParaRPr>
           </a:p>
           <a:p>
             <a:pPr lvl="1"/>
             <a:r>
-              <a:rPr lang="en-GB"/>
-              <a:t>$expand results have a separate paging mechanism (count, offset)</a:t>
-            </a:r>
-          </a:p>
-          <a:p>
-            <a:r>
-              <a:rPr lang="en-GB"/>
-              <a:t>May improve performance by requesting specific elements</a:t>
-            </a:r>
+              <a:rPr lang="en-US" dirty="0">
+                <a:hlinkClick r:id="rId3"/>
+              </a:rPr>
+              <a:t>http://tx.fhir.org/r3/ConceptMap/cm-address-use-v2/$translate?system=http://hl7.org/fhir/address-use&amp;code=home&amp;source=http://hl7.org/fhir/ValueSet/address-use&amp;target=http://hl7.org/fhir/ValueSet/v2-0190</a:t>
+            </a:r>
+            <a:endParaRPr lang="en-US" dirty="0"/>
           </a:p>
           <a:p>
             <a:pPr lvl="1"/>
             <a:r>
-              <a:rPr lang="en-GB"/>
-              <a:t>‘</a:t>
-            </a:r>
-            <a:r>
-              <a:rPr lang="en-GB" err="1"/>
-              <a:t>includeDefinition</a:t>
-            </a:r>
-            <a:r>
-              <a:rPr lang="en-GB"/>
-              <a:t>’ or ‘</a:t>
-            </a:r>
-            <a:r>
-              <a:rPr lang="en-GB" err="1"/>
-              <a:t>includeDesignations</a:t>
-            </a:r>
-            <a:r>
-              <a:rPr lang="en-GB"/>
-              <a:t>’ on $expand</a:t>
-            </a:r>
+              <a:rPr lang="en-US" dirty="0" err="1"/>
+              <a:t>ConceptMap</a:t>
+            </a:r>
+            <a:r>
+              <a:rPr lang="en-US" dirty="0"/>
+              <a:t> resource used in the example:</a:t>
+            </a:r>
+            <a:br>
+              <a:rPr lang="en-US" dirty="0"/>
+            </a:br>
+            <a:r>
+              <a:rPr lang="en-US" dirty="0">
+                <a:hlinkClick r:id="rId4"/>
+              </a:rPr>
+              <a:t>http://tx.fhir.org/r3/ConceptMap/cm-address-use-v2</a:t>
+            </a:r>
+            <a:endParaRPr lang="en-US" dirty="0">
+              <a:hlinkClick r:id="rId5"/>
+            </a:endParaRPr>
           </a:p>
           <a:p>
             <a:pPr lvl="1"/>
-            <a:r>
-              <a:rPr lang="en-GB"/>
-              <a:t>‘property’ to specify which properties to return on $lookup</a:t>
-            </a:r>
-          </a:p>
-          <a:p>
-            <a:pPr lvl="1"/>
-            <a:r>
-              <a:rPr lang="en-GB"/>
-              <a:t>‘_elements’ to request specific elements to be returned on search/read operation results</a:t>
-            </a:r>
-          </a:p>
-          <a:p>
-            <a:endParaRPr lang="en-US"/>
-          </a:p>
-        </p:txBody>
-      </p:sp>
-      <p:sp>
-        <p:nvSpPr>
-          <p:cNvPr id="4" name="Slide Number Placeholder 3">
-            <a:extLst>
-              <a:ext uri="{FF2B5EF4-FFF2-40B4-BE49-F238E27FC236}">
-                <a16:creationId xmlns:a16="http://schemas.microsoft.com/office/drawing/2014/main" id="{666C455F-A683-BE40-A9EC-D7025DD86994}"/>
-              </a:ext>
-            </a:extLst>
-          </p:cNvPr>
+            <a:endParaRPr lang="en-US" dirty="0">
+              <a:hlinkClick r:id="rId2"/>
+            </a:endParaRPr>
+          </a:p>
+          <a:p>
+            <a:endParaRPr lang="en-US" dirty="0"/>
+          </a:p>
+        </p:txBody>
+      </p:sp>
+      <p:sp>
+        <p:nvSpPr>
+          <p:cNvPr id="4" name="Slide Number Placeholder 3"/>
           <p:cNvSpPr>
             <a:spLocks noGrp="1"/>
           </p:cNvSpPr>
@@ -7984,7 +7943,7 @@
     </p:spTree>
     <p:extLst>
       <p:ext uri="{BB962C8B-B14F-4D97-AF65-F5344CB8AC3E}">
-        <p14:creationId xmlns:p14="http://schemas.microsoft.com/office/powerpoint/2010/main" val="1655705792"/>
+        <p14:creationId xmlns:p14="http://schemas.microsoft.com/office/powerpoint/2010/main" val="1667272130"/>
       </p:ext>
     </p:extLst>
   </p:cSld>
@@ -8034,7 +7993,7 @@
           <a:p>
             <a:r>
               <a:rPr lang="en-US"/>
-              <a:t>Other Useful Ideas</a:t>
+              <a:t>Some Useful Ideas</a:t>
             </a:r>
           </a:p>
         </p:txBody>
@@ -8061,60 +8020,92 @@
           <a:lstStyle/>
           <a:p>
             <a:r>
-              <a:rPr lang="en-GB" dirty="0"/>
-              <a:t>Batch Processing</a:t>
+              <a:rPr lang="en-GB"/>
+              <a:t>Paging</a:t>
             </a:r>
           </a:p>
           <a:p>
             <a:pPr lvl="1"/>
             <a:r>
-              <a:rPr lang="en-GB" dirty="0"/>
-              <a:t>Many terminology operations are small</a:t>
+              <a:rPr lang="en-GB"/>
+              <a:t>Search results can be paged</a:t>
+            </a:r>
+          </a:p>
+          <a:p>
+            <a:pPr lvl="2"/>
+            <a:r>
+              <a:rPr lang="en-GB"/>
+              <a:t>http://hl7.org/</a:t>
+            </a:r>
+            <a:r>
+              <a:rPr lang="en-GB" err="1"/>
+              <a:t>fhir</a:t>
+            </a:r>
+            <a:r>
+              <a:rPr lang="en-GB"/>
+              <a:t>/</a:t>
+            </a:r>
+            <a:r>
+              <a:rPr lang="en-GB" err="1"/>
+              <a:t>search.html</a:t>
+            </a:r>
+            <a:r>
+              <a:rPr lang="en-GB"/>
+              <a:t>, see the _count parameter</a:t>
             </a:r>
           </a:p>
           <a:p>
             <a:pPr lvl="1"/>
             <a:r>
-              <a:rPr lang="en-GB" dirty="0"/>
-              <a:t>It maybe more efficient to send them as a batch and deal with the result when it comes back</a:t>
-            </a:r>
-          </a:p>
-          <a:p>
-            <a:pPr lvl="2"/>
-            <a:r>
-              <a:rPr lang="en-GB" dirty="0">
-                <a:hlinkClick r:id="rId2"/>
-              </a:rPr>
-              <a:t>http://hl7.org/fhir/http.html#transaction</a:t>
-            </a:r>
-            <a:endParaRPr lang="en-GB" dirty="0"/>
-          </a:p>
-          <a:p>
-            <a:r>
-              <a:rPr lang="en-GB" dirty="0"/>
-              <a:t>Manage content types (Content-Type, Accept, _format)</a:t>
+              <a:rPr lang="en-GB"/>
+              <a:t>$expand results have a separate paging mechanism (count, offset)</a:t>
+            </a:r>
+          </a:p>
+          <a:p>
+            <a:r>
+              <a:rPr lang="en-GB"/>
+              <a:t>May improve performance by requesting specific elements</a:t>
             </a:r>
           </a:p>
           <a:p>
             <a:pPr lvl="1"/>
             <a:r>
-              <a:rPr lang="en-GB" dirty="0"/>
-              <a:t>JSON or XML</a:t>
-            </a:r>
-          </a:p>
-          <a:p>
-            <a:r>
-              <a:rPr lang="en-GB" dirty="0"/>
-              <a:t>Accept-Encoding: </a:t>
-            </a:r>
-            <a:r>
-              <a:rPr lang="en-GB" dirty="0" err="1"/>
-              <a:t>gzip</a:t>
-            </a:r>
-            <a:endParaRPr lang="en-GB" dirty="0"/>
-          </a:p>
-          <a:p>
-            <a:endParaRPr lang="en-US" dirty="0"/>
+              <a:rPr lang="en-GB"/>
+              <a:t>‘</a:t>
+            </a:r>
+            <a:r>
+              <a:rPr lang="en-GB" err="1"/>
+              <a:t>includeDefinition</a:t>
+            </a:r>
+            <a:r>
+              <a:rPr lang="en-GB"/>
+              <a:t>’ or ‘</a:t>
+            </a:r>
+            <a:r>
+              <a:rPr lang="en-GB" err="1"/>
+              <a:t>includeDesignations</a:t>
+            </a:r>
+            <a:r>
+              <a:rPr lang="en-GB"/>
+              <a:t>’ on $expand</a:t>
+            </a:r>
+          </a:p>
+          <a:p>
+            <a:pPr lvl="1"/>
+            <a:r>
+              <a:rPr lang="en-GB"/>
+              <a:t>‘property’ to specify which properties to return on $lookup</a:t>
+            </a:r>
+          </a:p>
+          <a:p>
+            <a:pPr lvl="1"/>
+            <a:r>
+              <a:rPr lang="en-GB"/>
+              <a:t>‘_elements’ to request specific elements to be returned on search/read operation results</a:t>
+            </a:r>
+          </a:p>
+          <a:p>
+            <a:endParaRPr lang="en-US"/>
           </a:p>
         </p:txBody>
       </p:sp>
@@ -8151,7 +8142,7 @@
     </p:spTree>
     <p:extLst>
       <p:ext uri="{BB962C8B-B14F-4D97-AF65-F5344CB8AC3E}">
-        <p14:creationId xmlns:p14="http://schemas.microsoft.com/office/powerpoint/2010/main" val="875811692"/>
+        <p14:creationId xmlns:p14="http://schemas.microsoft.com/office/powerpoint/2010/main" val="1655705792"/>
       </p:ext>
     </p:extLst>
   </p:cSld>
@@ -8200,8 +8191,8 @@
           <a:lstStyle/>
           <a:p>
             <a:r>
-              <a:rPr lang="en-US" dirty="0"/>
-              <a:t>Future Possibilities? R5?</a:t>
+              <a:rPr lang="en-US"/>
+              <a:t>Other Useful Ideas</a:t>
             </a:r>
           </a:p>
         </p:txBody>
@@ -8228,30 +8219,60 @@
           <a:lstStyle/>
           <a:p>
             <a:r>
-              <a:rPr lang="en-US" dirty="0"/>
-              <a:t>“Chaining” of $expand and $lookup operation</a:t>
+              <a:rPr lang="en-GB" dirty="0"/>
+              <a:t>Batch Processing</a:t>
             </a:r>
           </a:p>
           <a:p>
             <a:pPr lvl="1"/>
             <a:r>
-              <a:rPr lang="en-US" dirty="0"/>
-              <a:t>E.g. “pipe” the output of $expand to $lookup</a:t>
+              <a:rPr lang="en-GB" dirty="0"/>
+              <a:t>Many terminology operations are small</a:t>
             </a:r>
           </a:p>
           <a:p>
             <a:pPr lvl="1"/>
             <a:r>
-              <a:rPr lang="en-US" dirty="0"/>
-              <a:t>Would eliminate many additional calls to the server</a:t>
+              <a:rPr lang="en-GB" dirty="0"/>
+              <a:t>It maybe more efficient to send them as a batch and deal with the result when it comes back</a:t>
+            </a:r>
+          </a:p>
+          <a:p>
+            <a:pPr lvl="2"/>
+            <a:r>
+              <a:rPr lang="en-GB" dirty="0">
+                <a:hlinkClick r:id="rId2"/>
+              </a:rPr>
+              <a:t>http://hl7.org/fhir/http.html#transaction</a:t>
+            </a:r>
+            <a:endParaRPr lang="en-GB" dirty="0"/>
+          </a:p>
+          <a:p>
+            <a:r>
+              <a:rPr lang="en-GB" dirty="0"/>
+              <a:t>Manage content types (Content-Type, Accept, _format)</a:t>
             </a:r>
           </a:p>
           <a:p>
             <a:pPr lvl="1"/>
             <a:r>
-              <a:rPr lang="en-US" dirty="0"/>
-              <a:t>Grahame is working on it!</a:t>
-            </a:r>
+              <a:rPr lang="en-GB" dirty="0"/>
+              <a:t>JSON or XML</a:t>
+            </a:r>
+          </a:p>
+          <a:p>
+            <a:r>
+              <a:rPr lang="en-GB" dirty="0"/>
+              <a:t>Accept-Encoding: </a:t>
+            </a:r>
+            <a:r>
+              <a:rPr lang="en-GB" dirty="0" err="1"/>
+              <a:t>gzip</a:t>
+            </a:r>
+            <a:endParaRPr lang="en-GB" dirty="0"/>
+          </a:p>
+          <a:p>
+            <a:endParaRPr lang="en-US" dirty="0"/>
           </a:p>
         </p:txBody>
       </p:sp>
@@ -8280,6 +8301,143 @@
               <a:rPr lang="en-CA" smtClean="0"/>
               <a:pPr/>
               <a:t>27</a:t>
+            </a:fld>
+            <a:endParaRPr lang="en-CA"/>
+          </a:p>
+        </p:txBody>
+      </p:sp>
+    </p:spTree>
+    <p:extLst>
+      <p:ext uri="{BB962C8B-B14F-4D97-AF65-F5344CB8AC3E}">
+        <p14:creationId xmlns:p14="http://schemas.microsoft.com/office/powerpoint/2010/main" val="875811692"/>
+      </p:ext>
+    </p:extLst>
+  </p:cSld>
+  <p:clrMapOvr>
+    <a:masterClrMapping/>
+  </p:clrMapOvr>
+</p:sld>
+</file>
+
+<file path=ppt/slides/slide28.xml><?xml version="1.0" encoding="utf-8"?>
+<p:sld xmlns:a="http://schemas.openxmlformats.org/drawingml/2006/main" xmlns:r="http://schemas.openxmlformats.org/officeDocument/2006/relationships" xmlns:p="http://schemas.openxmlformats.org/presentationml/2006/main">
+  <p:cSld>
+    <p:spTree>
+      <p:nvGrpSpPr>
+        <p:cNvPr id="1" name=""/>
+        <p:cNvGrpSpPr/>
+        <p:nvPr/>
+      </p:nvGrpSpPr>
+      <p:grpSpPr>
+        <a:xfrm>
+          <a:off x="0" y="0"/>
+          <a:ext cx="0" cy="0"/>
+          <a:chOff x="0" y="0"/>
+          <a:chExt cx="0" cy="0"/>
+        </a:xfrm>
+      </p:grpSpPr>
+      <p:sp>
+        <p:nvSpPr>
+          <p:cNvPr id="2" name="Title 1">
+            <a:extLst>
+              <a:ext uri="{FF2B5EF4-FFF2-40B4-BE49-F238E27FC236}">
+                <a16:creationId xmlns:a16="http://schemas.microsoft.com/office/drawing/2014/main" id="{4212A2B2-4F5C-D04C-B5CE-8199AC5B3139}"/>
+              </a:ext>
+            </a:extLst>
+          </p:cNvPr>
+          <p:cNvSpPr>
+            <a:spLocks noGrp="1"/>
+          </p:cNvSpPr>
+          <p:nvPr>
+            <p:ph type="title"/>
+          </p:nvPr>
+        </p:nvSpPr>
+        <p:spPr/>
+        <p:txBody>
+          <a:bodyPr/>
+          <a:lstStyle/>
+          <a:p>
+            <a:r>
+              <a:rPr lang="en-US" dirty="0"/>
+              <a:t>Future Possibilities? R5?</a:t>
+            </a:r>
+          </a:p>
+        </p:txBody>
+      </p:sp>
+      <p:sp>
+        <p:nvSpPr>
+          <p:cNvPr id="3" name="Content Placeholder 2">
+            <a:extLst>
+              <a:ext uri="{FF2B5EF4-FFF2-40B4-BE49-F238E27FC236}">
+                <a16:creationId xmlns:a16="http://schemas.microsoft.com/office/drawing/2014/main" id="{6E2A823B-9416-8E44-A89D-BF39C8C5C3EC}"/>
+              </a:ext>
+            </a:extLst>
+          </p:cNvPr>
+          <p:cNvSpPr>
+            <a:spLocks noGrp="1"/>
+          </p:cNvSpPr>
+          <p:nvPr>
+            <p:ph idx="1"/>
+          </p:nvPr>
+        </p:nvSpPr>
+        <p:spPr/>
+        <p:txBody>
+          <a:bodyPr/>
+          <a:lstStyle/>
+          <a:p>
+            <a:r>
+              <a:rPr lang="en-US" dirty="0"/>
+              <a:t>“Chaining” of $expand and $lookup operation</a:t>
+            </a:r>
+          </a:p>
+          <a:p>
+            <a:pPr lvl="1"/>
+            <a:r>
+              <a:rPr lang="en-US" dirty="0"/>
+              <a:t>E.g. “pipe” the output of $expand to $lookup</a:t>
+            </a:r>
+          </a:p>
+          <a:p>
+            <a:pPr lvl="1"/>
+            <a:r>
+              <a:rPr lang="en-US" dirty="0"/>
+              <a:t>Would eliminate many additional calls to the server</a:t>
+            </a:r>
+          </a:p>
+          <a:p>
+            <a:pPr lvl="1"/>
+            <a:r>
+              <a:rPr lang="en-US" dirty="0"/>
+              <a:t>Grahame is working on it!</a:t>
+            </a:r>
+          </a:p>
+        </p:txBody>
+      </p:sp>
+      <p:sp>
+        <p:nvSpPr>
+          <p:cNvPr id="4" name="Slide Number Placeholder 3">
+            <a:extLst>
+              <a:ext uri="{FF2B5EF4-FFF2-40B4-BE49-F238E27FC236}">
+                <a16:creationId xmlns:a16="http://schemas.microsoft.com/office/drawing/2014/main" id="{666C455F-A683-BE40-A9EC-D7025DD86994}"/>
+              </a:ext>
+            </a:extLst>
+          </p:cNvPr>
+          <p:cNvSpPr>
+            <a:spLocks noGrp="1"/>
+          </p:cNvSpPr>
+          <p:nvPr>
+            <p:ph type="sldNum" sz="quarter" idx="4294967295"/>
+          </p:nvPr>
+        </p:nvSpPr>
+        <p:spPr/>
+        <p:txBody>
+          <a:bodyPr/>
+          <a:lstStyle/>
+          <a:p>
+            <a:fld id="{5CC3E5C4-3E2B-40F1-9F2B-C46CEB0C88DF}" type="slidenum">
+              <a:rPr lang="en-CA" smtClean="0"/>
+              <a:pPr/>
+              <a:t>28</a:t>
             </a:fld>
             <a:endParaRPr lang="en-CA"/>
           </a:p>
@@ -8298,7 +8456,7 @@
 </p:sld>
 </file>
 
-<file path=ppt/slides/slide28.xml><?xml version="1.0" encoding="utf-8"?>
+<file path=ppt/slides/slide29.xml><?xml version="1.0" encoding="utf-8"?>
 <p:sld xmlns:a="http://schemas.openxmlformats.org/drawingml/2006/main" xmlns:r="http://schemas.openxmlformats.org/officeDocument/2006/relationships" xmlns:p="http://schemas.openxmlformats.org/presentationml/2006/main">
   <p:cSld>
     <p:spTree>
@@ -8494,7 +8652,7 @@
             <a:fld id="{5CC3E5C4-3E2B-40F1-9F2B-C46CEB0C88DF}" type="slidenum">
               <a:rPr lang="en-CA" smtClean="0"/>
               <a:pPr/>
-              <a:t>28</a:t>
+              <a:t>29</a:t>
             </a:fld>
             <a:endParaRPr lang="en-CA" dirty="0"/>
           </a:p>
@@ -8504,194 +8662,6 @@
     <p:extLst>
       <p:ext uri="{BB962C8B-B14F-4D97-AF65-F5344CB8AC3E}">
         <p14:creationId xmlns:p14="http://schemas.microsoft.com/office/powerpoint/2010/main" val="2312340079"/>
-      </p:ext>
-    </p:extLst>
-  </p:cSld>
-  <p:clrMapOvr>
-    <a:masterClrMapping/>
-  </p:clrMapOvr>
-</p:sld>
-</file>
-
-<file path=ppt/slides/slide29.xml><?xml version="1.0" encoding="utf-8"?>
-<p:sld xmlns:a="http://schemas.openxmlformats.org/drawingml/2006/main" xmlns:r="http://schemas.openxmlformats.org/officeDocument/2006/relationships" xmlns:p="http://schemas.openxmlformats.org/presentationml/2006/main">
-  <p:cSld>
-    <p:spTree>
-      <p:nvGrpSpPr>
-        <p:cNvPr id="1" name=""/>
-        <p:cNvGrpSpPr/>
-        <p:nvPr/>
-      </p:nvGrpSpPr>
-      <p:grpSpPr>
-        <a:xfrm>
-          <a:off x="0" y="0"/>
-          <a:ext cx="0" cy="0"/>
-          <a:chOff x="0" y="0"/>
-          <a:chExt cx="0" cy="0"/>
-        </a:xfrm>
-      </p:grpSpPr>
-      <p:sp>
-        <p:nvSpPr>
-          <p:cNvPr id="2" name="Title 1"/>
-          <p:cNvSpPr>
-            <a:spLocks noGrp="1"/>
-          </p:cNvSpPr>
-          <p:nvPr>
-            <p:ph type="title"/>
-          </p:nvPr>
-        </p:nvSpPr>
-        <p:spPr/>
-        <p:txBody>
-          <a:bodyPr/>
-          <a:lstStyle/>
-          <a:p>
-            <a:r>
-              <a:rPr lang="en-US"/>
-              <a:t>Some Publicly Available Terminology Servers</a:t>
-            </a:r>
-          </a:p>
-        </p:txBody>
-      </p:sp>
-      <p:sp>
-        <p:nvSpPr>
-          <p:cNvPr id="3" name="Content Placeholder 2"/>
-          <p:cNvSpPr>
-            <a:spLocks noGrp="1"/>
-          </p:cNvSpPr>
-          <p:nvPr>
-            <p:ph idx="1"/>
-          </p:nvPr>
-        </p:nvSpPr>
-        <p:spPr/>
-        <p:txBody>
-          <a:bodyPr/>
-          <a:lstStyle/>
-          <a:p>
-            <a:r>
-              <a:rPr lang="en-US" dirty="0"/>
-              <a:t>Health Intersections (Grahame Grieve)</a:t>
-            </a:r>
-          </a:p>
-          <a:p>
-            <a:pPr lvl="1"/>
-            <a:r>
-              <a:rPr lang="en-US" dirty="0">
-                <a:hlinkClick r:id="rId2"/>
-              </a:rPr>
-              <a:t>http://tx.fhir.org/r3</a:t>
-            </a:r>
-            <a:endParaRPr lang="en-US" dirty="0"/>
-          </a:p>
-          <a:p>
-            <a:pPr lvl="1"/>
-            <a:r>
-              <a:rPr lang="en-US" dirty="0">
-                <a:hlinkClick r:id="rId3"/>
-              </a:rPr>
-              <a:t>http://tx.fhir.org/r4</a:t>
-            </a:r>
-            <a:endParaRPr lang="en-US" dirty="0"/>
-          </a:p>
-          <a:p>
-            <a:r>
-              <a:rPr lang="en-US" dirty="0"/>
-              <a:t>HAPI (University Health Network </a:t>
-            </a:r>
-            <a:r>
-              <a:rPr lang="mr-IN" dirty="0"/>
-              <a:t>–</a:t>
-            </a:r>
-            <a:r>
-              <a:rPr lang="en-US" dirty="0"/>
-              <a:t> James Agnew)</a:t>
-            </a:r>
-          </a:p>
-          <a:p>
-            <a:pPr lvl="1"/>
-            <a:r>
-              <a:rPr lang="en-US" dirty="0">
-                <a:hlinkClick r:id="rId4"/>
-              </a:rPr>
-              <a:t>http://fhirtest.uhn.ca/baseDstu3</a:t>
-            </a:r>
-            <a:endParaRPr lang="en-US" dirty="0"/>
-          </a:p>
-          <a:p>
-            <a:pPr lvl="1"/>
-            <a:r>
-              <a:rPr lang="en-US" dirty="0">
-                <a:hlinkClick r:id="rId4"/>
-              </a:rPr>
-              <a:t>http://fhirtest.uhn.ca/baseR4</a:t>
-            </a:r>
-            <a:endParaRPr lang="en-US" dirty="0"/>
-          </a:p>
-          <a:p>
-            <a:r>
-              <a:rPr lang="en-US" dirty="0" err="1"/>
-              <a:t>Terminz</a:t>
-            </a:r>
-            <a:r>
-              <a:rPr lang="en-US" dirty="0"/>
-              <a:t> (Patients First </a:t>
-            </a:r>
-            <a:r>
-              <a:rPr lang="mr-IN" dirty="0"/>
-              <a:t>–</a:t>
-            </a:r>
-            <a:r>
-              <a:rPr lang="en-US" dirty="0"/>
-              <a:t> New Zealand </a:t>
-            </a:r>
-            <a:r>
-              <a:rPr lang="mr-IN" dirty="0"/>
-              <a:t>–</a:t>
-            </a:r>
-            <a:r>
-              <a:rPr lang="en-US" dirty="0"/>
-              <a:t> Peter Jordan)</a:t>
-            </a:r>
-          </a:p>
-          <a:p>
-            <a:pPr lvl="1"/>
-            <a:r>
-              <a:rPr lang="en-US" dirty="0">
-                <a:hlinkClick r:id="rId5"/>
-              </a:rPr>
-              <a:t>http://its.patientsfirst.org.nz/RestService.svc/Terminz</a:t>
-            </a:r>
-            <a:endParaRPr lang="en-US" dirty="0"/>
-          </a:p>
-        </p:txBody>
-      </p:sp>
-      <p:sp>
-        <p:nvSpPr>
-          <p:cNvPr id="4" name="Slide Number Placeholder 3"/>
-          <p:cNvSpPr>
-            <a:spLocks noGrp="1"/>
-          </p:cNvSpPr>
-          <p:nvPr>
-            <p:ph type="sldNum" sz="quarter" idx="4294967295"/>
-          </p:nvPr>
-        </p:nvSpPr>
-        <p:spPr/>
-        <p:txBody>
-          <a:bodyPr/>
-          <a:lstStyle/>
-          <a:p>
-            <a:fld id="{5CC3E5C4-3E2B-40F1-9F2B-C46CEB0C88DF}" type="slidenum">
-              <a:rPr lang="en-CA" smtClean="0"/>
-              <a:pPr/>
-              <a:t>29</a:t>
-            </a:fld>
-            <a:endParaRPr lang="en-CA"/>
-          </a:p>
-        </p:txBody>
-      </p:sp>
-    </p:spTree>
-    <p:extLst>
-      <p:ext uri="{BB962C8B-B14F-4D97-AF65-F5344CB8AC3E}">
-        <p14:creationId xmlns:p14="http://schemas.microsoft.com/office/powerpoint/2010/main" val="1406576127"/>
       </p:ext>
     </p:extLst>
   </p:cSld>
@@ -8828,28 +8798,8 @@
           <a:lstStyle/>
           <a:p>
             <a:r>
-              <a:rPr lang="en-US" dirty="0" err="1"/>
-              <a:t>OntoServer</a:t>
-            </a:r>
-            <a:r>
               <a:rPr lang="en-US" dirty="0"/>
-              <a:t> (CSIRO </a:t>
-            </a:r>
-            <a:r>
-              <a:rPr lang="mr-IN" dirty="0"/>
-              <a:t>–</a:t>
-            </a:r>
-            <a:r>
-              <a:rPr lang="en-US" dirty="0"/>
-              <a:t> Australia </a:t>
-            </a:r>
-            <a:r>
-              <a:rPr lang="mr-IN" dirty="0"/>
-              <a:t>–</a:t>
-            </a:r>
-            <a:r>
-              <a:rPr lang="en-US" dirty="0"/>
-              <a:t> Michael Lawley)</a:t>
+              <a:t>Health Intersections (Grahame Grieve)</a:t>
             </a:r>
           </a:p>
           <a:p>
@@ -8858,15 +8808,9 @@
               <a:rPr lang="en-US" dirty="0">
                 <a:hlinkClick r:id="rId2"/>
               </a:rPr>
-              <a:t>http://ontoserver.csiro.au/stu3-latest</a:t>
+              <a:t>http://tx.fhir.org/r3</a:t>
             </a:r>
             <a:endParaRPr lang="en-US" dirty="0"/>
-          </a:p>
-          <a:p>
-            <a:r>
-              <a:rPr lang="en-US" dirty="0"/>
-              <a:t>Value Set Authority Center (VSAC) – US National Library of Medicine (NLM)</a:t>
-            </a:r>
           </a:p>
           <a:p>
             <a:pPr lvl="1"/>
@@ -8874,14 +8818,22 @@
               <a:rPr lang="en-US" dirty="0">
                 <a:hlinkClick r:id="rId3"/>
               </a:rPr>
-              <a:t>https://cts.nlm.nih.gov/fhir/</a:t>
+              <a:t>http://tx.fhir.org/r4</a:t>
             </a:r>
             <a:endParaRPr lang="en-US" dirty="0"/>
           </a:p>
           <a:p>
             <a:r>
               <a:rPr lang="en-US" dirty="0"/>
-              <a:t>Link to other publicly available FHIR servers (general and terminology)</a:t>
+              <a:t>HAPI (University Health Network </a:t>
+            </a:r>
+            <a:r>
+              <a:rPr lang="mr-IN" dirty="0"/>
+              <a:t>–</a:t>
+            </a:r>
+            <a:r>
+              <a:rPr lang="en-US" dirty="0"/>
+              <a:t> James Agnew)</a:t>
             </a:r>
           </a:p>
           <a:p>
@@ -8890,12 +8842,55 @@
               <a:rPr lang="en-US" dirty="0">
                 <a:hlinkClick r:id="rId4"/>
               </a:rPr>
-              <a:t>http://wiki.hl7.org/index.php?title=Publicly_Available_FHIR_Servers_for_testing</a:t>
+              <a:t>http://fhirtest.uhn.ca/baseDstu3</a:t>
+            </a:r>
+            <a:endParaRPr lang="en-US" dirty="0"/>
+          </a:p>
+          <a:p>
+            <a:pPr lvl="1"/>
+            <a:r>
+              <a:rPr lang="en-US" dirty="0">
+                <a:hlinkClick r:id="rId4"/>
+              </a:rPr>
+              <a:t>http://fhirtest.uhn.ca/baseR4</a:t>
+            </a:r>
+            <a:endParaRPr lang="en-US" dirty="0"/>
+          </a:p>
+          <a:p>
+            <a:r>
+              <a:rPr lang="en-US" dirty="0" err="1"/>
+              <a:t>Terminz</a:t>
             </a:r>
             <a:r>
               <a:rPr lang="en-US" dirty="0"/>
-              <a:t> </a:t>
-            </a:r>
+              <a:t> (Patients First </a:t>
+            </a:r>
+            <a:r>
+              <a:rPr lang="mr-IN" dirty="0"/>
+              <a:t>–</a:t>
+            </a:r>
+            <a:r>
+              <a:rPr lang="en-US" dirty="0"/>
+              <a:t> New Zealand </a:t>
+            </a:r>
+            <a:r>
+              <a:rPr lang="mr-IN" dirty="0"/>
+              <a:t>–</a:t>
+            </a:r>
+            <a:r>
+              <a:rPr lang="en-US" dirty="0"/>
+              <a:t> Peter Jordan)</a:t>
+            </a:r>
+          </a:p>
+          <a:p>
+            <a:pPr lvl="1"/>
+            <a:r>
+              <a:rPr lang="en-US" dirty="0">
+                <a:hlinkClick r:id="rId5"/>
+              </a:rPr>
+              <a:t>http://its.patientsfirst.org.nz/RestService.svc/Terminz</a:t>
+            </a:r>
+            <a:endParaRPr lang="en-US" dirty="0"/>
           </a:p>
         </p:txBody>
       </p:sp>
@@ -8926,7 +8921,7 @@
     </p:spTree>
     <p:extLst>
       <p:ext uri="{BB962C8B-B14F-4D97-AF65-F5344CB8AC3E}">
-        <p14:creationId xmlns:p14="http://schemas.microsoft.com/office/powerpoint/2010/main" val="3282373662"/>
+        <p14:creationId xmlns:p14="http://schemas.microsoft.com/office/powerpoint/2010/main" val="1406576127"/>
       </p:ext>
     </p:extLst>
   </p:cSld>
@@ -8970,7 +8965,7 @@
           <a:p>
             <a:r>
               <a:rPr lang="en-US"/>
-              <a:t>Some Useful Tools</a:t>
+              <a:t>Some Publicly Available Terminology Servers</a:t>
             </a:r>
           </a:p>
         </p:txBody>
@@ -8991,88 +8986,74 @@
           <a:lstStyle/>
           <a:p>
             <a:r>
-              <a:rPr lang="en-US" err="1"/>
-              <a:t>clinFHIR</a:t>
-            </a:r>
-            <a:r>
-              <a:rPr lang="en-US"/>
-              <a:t> (David Hay)</a:t>
+              <a:rPr lang="en-US" dirty="0" err="1"/>
+              <a:t>OntoServer</a:t>
+            </a:r>
+            <a:r>
+              <a:rPr lang="en-US" dirty="0"/>
+              <a:t> (CSIRO </a:t>
+            </a:r>
+            <a:r>
+              <a:rPr lang="mr-IN" dirty="0"/>
+              <a:t>–</a:t>
+            </a:r>
+            <a:r>
+              <a:rPr lang="en-US" dirty="0"/>
+              <a:t> Australia </a:t>
+            </a:r>
+            <a:r>
+              <a:rPr lang="mr-IN" dirty="0"/>
+              <a:t>–</a:t>
+            </a:r>
+            <a:r>
+              <a:rPr lang="en-US" dirty="0"/>
+              <a:t> Michael Lawley)</a:t>
             </a:r>
           </a:p>
           <a:p>
             <a:pPr lvl="1"/>
             <a:r>
-              <a:rPr lang="en-US" err="1"/>
-              <a:t>CodeSystem</a:t>
-            </a:r>
-            <a:r>
-              <a:rPr lang="en-US"/>
-              <a:t> builder</a:t>
-            </a:r>
-          </a:p>
-          <a:p>
-            <a:pPr lvl="2"/>
-            <a:r>
-              <a:rPr lang="en-US">
+              <a:rPr lang="en-US" dirty="0">
                 <a:hlinkClick r:id="rId2"/>
               </a:rPr>
-              <a:t>http://clinfhir.com/codeSystem.html</a:t>
-            </a:r>
-            <a:endParaRPr lang="en-US"/>
+              <a:t>http://ontoserver.csiro.au/stu3-latest</a:t>
+            </a:r>
+            <a:endParaRPr lang="en-US" dirty="0"/>
+          </a:p>
+          <a:p>
+            <a:r>
+              <a:rPr lang="en-US" dirty="0"/>
+              <a:t>Value Set Authority Center (VSAC) – US National Library of Medicine (NLM)</a:t>
+            </a:r>
           </a:p>
           <a:p>
             <a:pPr lvl="1"/>
             <a:r>
-              <a:rPr lang="en-US" err="1"/>
-              <a:t>ValueSet</a:t>
-            </a:r>
-            <a:r>
-              <a:rPr lang="en-US"/>
-              <a:t> explorer</a:t>
-            </a:r>
-          </a:p>
-          <a:p>
-            <a:pPr lvl="2"/>
-            <a:r>
-              <a:rPr lang="en-US">
+              <a:rPr lang="en-US" dirty="0">
                 <a:hlinkClick r:id="rId3"/>
               </a:rPr>
-              <a:t>http://clinfhir.com/valuesetCreator.html</a:t>
-            </a:r>
-            <a:endParaRPr lang="en-US"/>
+              <a:t>https://cts.nlm.nih.gov/fhir/</a:t>
+            </a:r>
+            <a:endParaRPr lang="en-US" dirty="0"/>
+          </a:p>
+          <a:p>
+            <a:r>
+              <a:rPr lang="en-US" dirty="0"/>
+              <a:t>Link to other publicly available FHIR servers (general and terminology)</a:t>
+            </a:r>
           </a:p>
           <a:p>
             <a:pPr lvl="1"/>
             <a:r>
-              <a:rPr lang="en-US"/>
-              <a:t>Query Tool</a:t>
-            </a:r>
-          </a:p>
-          <a:p>
-            <a:pPr lvl="2"/>
-            <a:r>
-              <a:rPr lang="en-US">
+              <a:rPr lang="en-US" dirty="0">
                 <a:hlinkClick r:id="rId4"/>
               </a:rPr>
-              <a:t>http://clinfhir.com/query.html</a:t>
-            </a:r>
-            <a:endParaRPr lang="en-US"/>
-          </a:p>
-          <a:p>
-            <a:r>
-              <a:rPr lang="en-US"/>
-              <a:t>Postman</a:t>
-            </a:r>
-          </a:p>
-          <a:p>
-            <a:pPr lvl="1"/>
-            <a:r>
-              <a:rPr lang="en-US">
-                <a:hlinkClick r:id="rId5"/>
-              </a:rPr>
-              <a:t>https://www.getpostman.com/</a:t>
-            </a:r>
-            <a:endParaRPr lang="en-US"/>
+              <a:t>http://wiki.hl7.org/index.php?title=Publicly_Available_FHIR_Servers_for_testing</a:t>
+            </a:r>
+            <a:r>
+              <a:rPr lang="en-US" dirty="0"/>
+              <a:t> </a:t>
+            </a:r>
           </a:p>
         </p:txBody>
       </p:sp>
@@ -9103,7 +9084,7 @@
     </p:spTree>
     <p:extLst>
       <p:ext uri="{BB962C8B-B14F-4D97-AF65-F5344CB8AC3E}">
-        <p14:creationId xmlns:p14="http://schemas.microsoft.com/office/powerpoint/2010/main" val="765600913"/>
+        <p14:creationId xmlns:p14="http://schemas.microsoft.com/office/powerpoint/2010/main" val="3282373662"/>
       </p:ext>
     </p:extLst>
   </p:cSld>
@@ -9146,6 +9127,183 @@
           <a:lstStyle/>
           <a:p>
             <a:r>
+              <a:rPr lang="en-US"/>
+              <a:t>Some Useful Tools</a:t>
+            </a:r>
+          </a:p>
+        </p:txBody>
+      </p:sp>
+      <p:sp>
+        <p:nvSpPr>
+          <p:cNvPr id="3" name="Content Placeholder 2"/>
+          <p:cNvSpPr>
+            <a:spLocks noGrp="1"/>
+          </p:cNvSpPr>
+          <p:nvPr>
+            <p:ph idx="1"/>
+          </p:nvPr>
+        </p:nvSpPr>
+        <p:spPr/>
+        <p:txBody>
+          <a:bodyPr/>
+          <a:lstStyle/>
+          <a:p>
+            <a:r>
+              <a:rPr lang="en-US" err="1"/>
+              <a:t>clinFHIR</a:t>
+            </a:r>
+            <a:r>
+              <a:rPr lang="en-US"/>
+              <a:t> (David Hay)</a:t>
+            </a:r>
+          </a:p>
+          <a:p>
+            <a:pPr lvl="1"/>
+            <a:r>
+              <a:rPr lang="en-US" err="1"/>
+              <a:t>CodeSystem</a:t>
+            </a:r>
+            <a:r>
+              <a:rPr lang="en-US"/>
+              <a:t> builder</a:t>
+            </a:r>
+          </a:p>
+          <a:p>
+            <a:pPr lvl="2"/>
+            <a:r>
+              <a:rPr lang="en-US">
+                <a:hlinkClick r:id="rId2"/>
+              </a:rPr>
+              <a:t>http://clinfhir.com/codeSystem.html</a:t>
+            </a:r>
+            <a:endParaRPr lang="en-US"/>
+          </a:p>
+          <a:p>
+            <a:pPr lvl="1"/>
+            <a:r>
+              <a:rPr lang="en-US" err="1"/>
+              <a:t>ValueSet</a:t>
+            </a:r>
+            <a:r>
+              <a:rPr lang="en-US"/>
+              <a:t> explorer</a:t>
+            </a:r>
+          </a:p>
+          <a:p>
+            <a:pPr lvl="2"/>
+            <a:r>
+              <a:rPr lang="en-US">
+                <a:hlinkClick r:id="rId3"/>
+              </a:rPr>
+              <a:t>http://clinfhir.com/valuesetCreator.html</a:t>
+            </a:r>
+            <a:endParaRPr lang="en-US"/>
+          </a:p>
+          <a:p>
+            <a:pPr lvl="1"/>
+            <a:r>
+              <a:rPr lang="en-US"/>
+              <a:t>Query Tool</a:t>
+            </a:r>
+          </a:p>
+          <a:p>
+            <a:pPr lvl="2"/>
+            <a:r>
+              <a:rPr lang="en-US">
+                <a:hlinkClick r:id="rId4"/>
+              </a:rPr>
+              <a:t>http://clinfhir.com/query.html</a:t>
+            </a:r>
+            <a:endParaRPr lang="en-US"/>
+          </a:p>
+          <a:p>
+            <a:r>
+              <a:rPr lang="en-US"/>
+              <a:t>Postman</a:t>
+            </a:r>
+          </a:p>
+          <a:p>
+            <a:pPr lvl="1"/>
+            <a:r>
+              <a:rPr lang="en-US">
+                <a:hlinkClick r:id="rId5"/>
+              </a:rPr>
+              <a:t>https://www.getpostman.com/</a:t>
+            </a:r>
+            <a:endParaRPr lang="en-US"/>
+          </a:p>
+        </p:txBody>
+      </p:sp>
+      <p:sp>
+        <p:nvSpPr>
+          <p:cNvPr id="4" name="Slide Number Placeholder 3"/>
+          <p:cNvSpPr>
+            <a:spLocks noGrp="1"/>
+          </p:cNvSpPr>
+          <p:nvPr>
+            <p:ph type="sldNum" sz="quarter" idx="4294967295"/>
+          </p:nvPr>
+        </p:nvSpPr>
+        <p:spPr/>
+        <p:txBody>
+          <a:bodyPr/>
+          <a:lstStyle/>
+          <a:p>
+            <a:fld id="{5CC3E5C4-3E2B-40F1-9F2B-C46CEB0C88DF}" type="slidenum">
+              <a:rPr lang="en-CA" smtClean="0"/>
+              <a:pPr/>
+              <a:t>32</a:t>
+            </a:fld>
+            <a:endParaRPr lang="en-CA"/>
+          </a:p>
+        </p:txBody>
+      </p:sp>
+    </p:spTree>
+    <p:extLst>
+      <p:ext uri="{BB962C8B-B14F-4D97-AF65-F5344CB8AC3E}">
+        <p14:creationId xmlns:p14="http://schemas.microsoft.com/office/powerpoint/2010/main" val="765600913"/>
+      </p:ext>
+    </p:extLst>
+  </p:cSld>
+  <p:clrMapOvr>
+    <a:masterClrMapping/>
+  </p:clrMapOvr>
+</p:sld>
+</file>
+
+<file path=ppt/slides/slide33.xml><?xml version="1.0" encoding="utf-8"?>
+<p:sld xmlns:a="http://schemas.openxmlformats.org/drawingml/2006/main" xmlns:r="http://schemas.openxmlformats.org/officeDocument/2006/relationships" xmlns:p="http://schemas.openxmlformats.org/presentationml/2006/main">
+  <p:cSld>
+    <p:spTree>
+      <p:nvGrpSpPr>
+        <p:cNvPr id="1" name=""/>
+        <p:cNvGrpSpPr/>
+        <p:nvPr/>
+      </p:nvGrpSpPr>
+      <p:grpSpPr>
+        <a:xfrm>
+          <a:off x="0" y="0"/>
+          <a:ext cx="0" cy="0"/>
+          <a:chOff x="0" y="0"/>
+          <a:chExt cx="0" cy="0"/>
+        </a:xfrm>
+      </p:grpSpPr>
+      <p:sp>
+        <p:nvSpPr>
+          <p:cNvPr id="2" name="Title 1"/>
+          <p:cNvSpPr>
+            <a:spLocks noGrp="1"/>
+          </p:cNvSpPr>
+          <p:nvPr>
+            <p:ph type="title"/>
+          </p:nvPr>
+        </p:nvSpPr>
+        <p:spPr/>
+        <p:txBody>
+          <a:bodyPr/>
+          <a:lstStyle/>
+          <a:p>
+            <a:r>
               <a:rPr lang="en-US" dirty="0"/>
               <a:t>Some Useful Tools (cont.)</a:t>
             </a:r>
@@ -9218,7 +9376,7 @@
             <a:fld id="{5CC3E5C4-3E2B-40F1-9F2B-C46CEB0C88DF}" type="slidenum">
               <a:rPr lang="en-CA" smtClean="0"/>
               <a:pPr/>
-              <a:t>32</a:t>
+              <a:t>33</a:t>
             </a:fld>
             <a:endParaRPr lang="en-CA"/>
           </a:p>

</xml_diff>